<commit_message>
Added Java Basics Demo
</commit_message>
<xml_diff>
--- a/02.java-basics.pptx
+++ b/02.java-basics.pptx
@@ -7,7 +7,29 @@
   <p:sldIdLst>
     <p:sldId id="256" r:id="rId2"/>
     <p:sldId id="257" r:id="rId3"/>
-    <p:sldId id="258" r:id="rId4"/>
+    <p:sldId id="259" r:id="rId4"/>
+    <p:sldId id="258" r:id="rId5"/>
+    <p:sldId id="260" r:id="rId6"/>
+    <p:sldId id="261" r:id="rId7"/>
+    <p:sldId id="262" r:id="rId8"/>
+    <p:sldId id="263" r:id="rId9"/>
+    <p:sldId id="264" r:id="rId10"/>
+    <p:sldId id="265" r:id="rId11"/>
+    <p:sldId id="266" r:id="rId12"/>
+    <p:sldId id="267" r:id="rId13"/>
+    <p:sldId id="268" r:id="rId14"/>
+    <p:sldId id="269" r:id="rId15"/>
+    <p:sldId id="270" r:id="rId16"/>
+    <p:sldId id="271" r:id="rId17"/>
+    <p:sldId id="272" r:id="rId18"/>
+    <p:sldId id="273" r:id="rId19"/>
+    <p:sldId id="274" r:id="rId20"/>
+    <p:sldId id="275" r:id="rId21"/>
+    <p:sldId id="276" r:id="rId22"/>
+    <p:sldId id="277" r:id="rId23"/>
+    <p:sldId id="278" r:id="rId24"/>
+    <p:sldId id="279" r:id="rId25"/>
+    <p:sldId id="280" r:id="rId26"/>
   </p:sldIdLst>
   <p:sldSz cx="12192000" cy="6858000"/>
   <p:notesSz cx="6858000" cy="9144000"/>
@@ -164,7 +186,7 @@
           <a:noFill/>
           <a:extLst>
             <a:ext uri="{909E8E84-426E-40dd-AFC4-6F175D3DCCD1}">
-              <a14:hiddenFill xmlns="" xmlns:a14="http://schemas.microsoft.com/office/drawing/2010/main">
+              <a14:hiddenFill xmlns:a14="http://schemas.microsoft.com/office/drawing/2010/main" xmlns="">
                 <a:solidFill>
                   <a:srgbClr val="FFFFFF"/>
                 </a:solidFill>
@@ -224,7 +246,7 @@
             </a:ln>
             <a:extLst>
               <a:ext uri="{91240B29-F687-4f45-9708-019B960494DF}">
-                <a14:hiddenLine xmlns="" xmlns:a14="http://schemas.microsoft.com/office/drawing/2010/main" w="9525">
+                <a14:hiddenLine xmlns:a14="http://schemas.microsoft.com/office/drawing/2010/main" xmlns="" w="9525">
                   <a:solidFill>
                     <a:srgbClr val="000000"/>
                   </a:solidFill>
@@ -314,7 +336,7 @@
             </a:ln>
             <a:extLst>
               <a:ext uri="{91240B29-F687-4f45-9708-019B960494DF}">
-                <a14:hiddenLine xmlns="" xmlns:a14="http://schemas.microsoft.com/office/drawing/2010/main" w="9525">
+                <a14:hiddenLine xmlns:a14="http://schemas.microsoft.com/office/drawing/2010/main" xmlns="" w="9525">
                   <a:solidFill>
                     <a:srgbClr val="000000"/>
                   </a:solidFill>
@@ -404,7 +426,7 @@
             </a:ln>
             <a:extLst>
               <a:ext uri="{91240B29-F687-4f45-9708-019B960494DF}">
-                <a14:hiddenLine xmlns="" xmlns:a14="http://schemas.microsoft.com/office/drawing/2010/main" w="9525">
+                <a14:hiddenLine xmlns:a14="http://schemas.microsoft.com/office/drawing/2010/main" xmlns="" w="9525">
                   <a:solidFill>
                     <a:srgbClr val="000000"/>
                   </a:solidFill>
@@ -438,7 +460,7 @@
             </a:ln>
             <a:extLst>
               <a:ext uri="{91240B29-F687-4f45-9708-019B960494DF}">
-                <a14:hiddenLine xmlns="" xmlns:a14="http://schemas.microsoft.com/office/drawing/2010/main" w="9525">
+                <a14:hiddenLine xmlns:a14="http://schemas.microsoft.com/office/drawing/2010/main" xmlns="" w="9525">
                   <a:solidFill>
                     <a:srgbClr val="000000"/>
                   </a:solidFill>
@@ -528,7 +550,7 @@
             </a:ln>
             <a:extLst>
               <a:ext uri="{91240B29-F687-4f45-9708-019B960494DF}">
-                <a14:hiddenLine xmlns="" xmlns:a14="http://schemas.microsoft.com/office/drawing/2010/main" w="9525">
+                <a14:hiddenLine xmlns:a14="http://schemas.microsoft.com/office/drawing/2010/main" xmlns="" w="9525">
                   <a:solidFill>
                     <a:srgbClr val="000000"/>
                   </a:solidFill>
@@ -590,7 +612,7 @@
             </a:ln>
             <a:extLst>
               <a:ext uri="{91240B29-F687-4f45-9708-019B960494DF}">
-                <a14:hiddenLine xmlns="" xmlns:a14="http://schemas.microsoft.com/office/drawing/2010/main" w="9525">
+                <a14:hiddenLine xmlns:a14="http://schemas.microsoft.com/office/drawing/2010/main" xmlns="" w="9525">
                   <a:solidFill>
                     <a:srgbClr val="000000"/>
                   </a:solidFill>
@@ -652,7 +674,7 @@
             </a:ln>
             <a:extLst>
               <a:ext uri="{91240B29-F687-4f45-9708-019B960494DF}">
-                <a14:hiddenLine xmlns="" xmlns:a14="http://schemas.microsoft.com/office/drawing/2010/main" w="9525">
+                <a14:hiddenLine xmlns:a14="http://schemas.microsoft.com/office/drawing/2010/main" xmlns="" w="9525">
                   <a:solidFill>
                     <a:srgbClr val="000000"/>
                   </a:solidFill>
@@ -742,7 +764,7 @@
             </a:ln>
             <a:extLst>
               <a:ext uri="{91240B29-F687-4f45-9708-019B960494DF}">
-                <a14:hiddenLine xmlns="" xmlns:a14="http://schemas.microsoft.com/office/drawing/2010/main" w="9525">
+                <a14:hiddenLine xmlns:a14="http://schemas.microsoft.com/office/drawing/2010/main" xmlns="" w="9525">
                   <a:solidFill>
                     <a:srgbClr val="000000"/>
                   </a:solidFill>
@@ -804,7 +826,7 @@
             </a:ln>
             <a:extLst>
               <a:ext uri="{91240B29-F687-4f45-9708-019B960494DF}">
-                <a14:hiddenLine xmlns="" xmlns:a14="http://schemas.microsoft.com/office/drawing/2010/main" w="9525">
+                <a14:hiddenLine xmlns:a14="http://schemas.microsoft.com/office/drawing/2010/main" xmlns="" w="9525">
                   <a:solidFill>
                     <a:srgbClr val="000000"/>
                   </a:solidFill>
@@ -866,7 +888,7 @@
             </a:ln>
             <a:extLst>
               <a:ext uri="{91240B29-F687-4f45-9708-019B960494DF}">
-                <a14:hiddenLine xmlns="" xmlns:a14="http://schemas.microsoft.com/office/drawing/2010/main" w="9525">
+                <a14:hiddenLine xmlns:a14="http://schemas.microsoft.com/office/drawing/2010/main" xmlns="" w="9525">
                   <a:solidFill>
                     <a:srgbClr val="000000"/>
                   </a:solidFill>
@@ -956,7 +978,7 @@
             </a:ln>
             <a:extLst>
               <a:ext uri="{91240B29-F687-4f45-9708-019B960494DF}">
-                <a14:hiddenLine xmlns="" xmlns:a14="http://schemas.microsoft.com/office/drawing/2010/main" w="9525">
+                <a14:hiddenLine xmlns:a14="http://schemas.microsoft.com/office/drawing/2010/main" xmlns="" w="9525">
                   <a:solidFill>
                     <a:srgbClr val="000000"/>
                   </a:solidFill>
@@ -1046,7 +1068,7 @@
             </a:ln>
             <a:extLst>
               <a:ext uri="{91240B29-F687-4f45-9708-019B960494DF}">
-                <a14:hiddenLine xmlns="" xmlns:a14="http://schemas.microsoft.com/office/drawing/2010/main" w="9525">
+                <a14:hiddenLine xmlns:a14="http://schemas.microsoft.com/office/drawing/2010/main" xmlns="" w="9525">
                   <a:solidFill>
                     <a:srgbClr val="000000"/>
                   </a:solidFill>
@@ -1108,7 +1130,7 @@
             </a:ln>
             <a:extLst>
               <a:ext uri="{91240B29-F687-4f45-9708-019B960494DF}">
-                <a14:hiddenLine xmlns="" xmlns:a14="http://schemas.microsoft.com/office/drawing/2010/main" w="9525">
+                <a14:hiddenLine xmlns:a14="http://schemas.microsoft.com/office/drawing/2010/main" xmlns="" w="9525">
                   <a:solidFill>
                     <a:srgbClr val="000000"/>
                   </a:solidFill>
@@ -1218,7 +1240,7 @@
             </a:ln>
             <a:extLst>
               <a:ext uri="{91240B29-F687-4f45-9708-019B960494DF}">
-                <a14:hiddenLine xmlns="" xmlns:a14="http://schemas.microsoft.com/office/drawing/2010/main" w="9525">
+                <a14:hiddenLine xmlns:a14="http://schemas.microsoft.com/office/drawing/2010/main" xmlns="" w="9525">
                   <a:solidFill>
                     <a:srgbClr val="000000"/>
                   </a:solidFill>
@@ -1280,7 +1302,7 @@
             </a:ln>
             <a:extLst>
               <a:ext uri="{91240B29-F687-4f45-9708-019B960494DF}">
-                <a14:hiddenLine xmlns="" xmlns:a14="http://schemas.microsoft.com/office/drawing/2010/main" w="9525">
+                <a14:hiddenLine xmlns:a14="http://schemas.microsoft.com/office/drawing/2010/main" xmlns="" w="9525">
                   <a:solidFill>
                     <a:srgbClr val="000000"/>
                   </a:solidFill>
@@ -1370,7 +1392,7 @@
             </a:ln>
             <a:extLst>
               <a:ext uri="{91240B29-F687-4f45-9708-019B960494DF}">
-                <a14:hiddenLine xmlns="" xmlns:a14="http://schemas.microsoft.com/office/drawing/2010/main" w="9525">
+                <a14:hiddenLine xmlns:a14="http://schemas.microsoft.com/office/drawing/2010/main" xmlns="" w="9525">
                   <a:solidFill>
                     <a:srgbClr val="000000"/>
                   </a:solidFill>
@@ -1460,7 +1482,7 @@
             </a:ln>
             <a:extLst>
               <a:ext uri="{91240B29-F687-4f45-9708-019B960494DF}">
-                <a14:hiddenLine xmlns="" xmlns:a14="http://schemas.microsoft.com/office/drawing/2010/main" w="9525">
+                <a14:hiddenLine xmlns:a14="http://schemas.microsoft.com/office/drawing/2010/main" xmlns="" w="9525">
                   <a:solidFill>
                     <a:srgbClr val="000000"/>
                   </a:solidFill>
@@ -1522,7 +1544,7 @@
             </a:ln>
             <a:extLst>
               <a:ext uri="{91240B29-F687-4f45-9708-019B960494DF}">
-                <a14:hiddenLine xmlns="" xmlns:a14="http://schemas.microsoft.com/office/drawing/2010/main" w="9525">
+                <a14:hiddenLine xmlns:a14="http://schemas.microsoft.com/office/drawing/2010/main" xmlns="" w="9525">
                   <a:solidFill>
                     <a:srgbClr val="000000"/>
                   </a:solidFill>
@@ -1612,7 +1634,7 @@
             </a:ln>
             <a:extLst>
               <a:ext uri="{91240B29-F687-4f45-9708-019B960494DF}">
-                <a14:hiddenLine xmlns="" xmlns:a14="http://schemas.microsoft.com/office/drawing/2010/main" w="9525">
+                <a14:hiddenLine xmlns:a14="http://schemas.microsoft.com/office/drawing/2010/main" xmlns="" w="9525">
                   <a:solidFill>
                     <a:srgbClr val="000000"/>
                   </a:solidFill>
@@ -1702,7 +1724,7 @@
             </a:ln>
             <a:extLst>
               <a:ext uri="{91240B29-F687-4f45-9708-019B960494DF}">
-                <a14:hiddenLine xmlns="" xmlns:a14="http://schemas.microsoft.com/office/drawing/2010/main" w="9525">
+                <a14:hiddenLine xmlns:a14="http://schemas.microsoft.com/office/drawing/2010/main" xmlns="" w="9525">
                   <a:solidFill>
                     <a:srgbClr val="000000"/>
                   </a:solidFill>
@@ -1758,7 +1780,7 @@
             </a:ln>
             <a:extLst>
               <a:ext uri="{91240B29-F687-4f45-9708-019B960494DF}">
-                <a14:hiddenLine xmlns="" xmlns:a14="http://schemas.microsoft.com/office/drawing/2010/main" w="9525">
+                <a14:hiddenLine xmlns:a14="http://schemas.microsoft.com/office/drawing/2010/main" xmlns="" w="9525">
                   <a:solidFill>
                     <a:srgbClr val="000000"/>
                   </a:solidFill>
@@ -1848,7 +1870,7 @@
             </a:ln>
             <a:extLst>
               <a:ext uri="{91240B29-F687-4f45-9708-019B960494DF}">
-                <a14:hiddenLine xmlns="" xmlns:a14="http://schemas.microsoft.com/office/drawing/2010/main" w="9525">
+                <a14:hiddenLine xmlns:a14="http://schemas.microsoft.com/office/drawing/2010/main" xmlns="" w="9525">
                   <a:solidFill>
                     <a:srgbClr val="000000"/>
                   </a:solidFill>
@@ -1904,7 +1926,7 @@
             </a:ln>
             <a:extLst>
               <a:ext uri="{91240B29-F687-4f45-9708-019B960494DF}">
-                <a14:hiddenLine xmlns="" xmlns:a14="http://schemas.microsoft.com/office/drawing/2010/main" w="9525">
+                <a14:hiddenLine xmlns:a14="http://schemas.microsoft.com/office/drawing/2010/main" xmlns="" w="9525">
                   <a:solidFill>
                     <a:srgbClr val="000000"/>
                   </a:solidFill>
@@ -1994,7 +2016,7 @@
             </a:ln>
             <a:extLst>
               <a:ext uri="{91240B29-F687-4f45-9708-019B960494DF}">
-                <a14:hiddenLine xmlns="" xmlns:a14="http://schemas.microsoft.com/office/drawing/2010/main" w="9525">
+                <a14:hiddenLine xmlns:a14="http://schemas.microsoft.com/office/drawing/2010/main" xmlns="" w="9525">
                   <a:solidFill>
                     <a:srgbClr val="000000"/>
                   </a:solidFill>
@@ -2062,7 +2084,7 @@
             </a:ln>
             <a:extLst>
               <a:ext uri="{91240B29-F687-4f45-9708-019B960494DF}">
-                <a14:hiddenLine xmlns="" xmlns:a14="http://schemas.microsoft.com/office/drawing/2010/main" w="9525">
+                <a14:hiddenLine xmlns:a14="http://schemas.microsoft.com/office/drawing/2010/main" xmlns="" w="9525">
                   <a:solidFill>
                     <a:srgbClr val="000000"/>
                   </a:solidFill>
@@ -2152,7 +2174,7 @@
             </a:ln>
             <a:extLst>
               <a:ext uri="{91240B29-F687-4f45-9708-019B960494DF}">
-                <a14:hiddenLine xmlns="" xmlns:a14="http://schemas.microsoft.com/office/drawing/2010/main" w="9525">
+                <a14:hiddenLine xmlns:a14="http://schemas.microsoft.com/office/drawing/2010/main" xmlns="" w="9525">
                   <a:solidFill>
                     <a:srgbClr val="000000"/>
                   </a:solidFill>
@@ -2220,7 +2242,7 @@
             </a:ln>
             <a:extLst>
               <a:ext uri="{91240B29-F687-4f45-9708-019B960494DF}">
-                <a14:hiddenLine xmlns="" xmlns:a14="http://schemas.microsoft.com/office/drawing/2010/main" w="9525">
+                <a14:hiddenLine xmlns:a14="http://schemas.microsoft.com/office/drawing/2010/main" xmlns="" w="9525">
                   <a:solidFill>
                     <a:srgbClr val="000000"/>
                   </a:solidFill>
@@ -2310,7 +2332,7 @@
             </a:ln>
             <a:extLst>
               <a:ext uri="{91240B29-F687-4f45-9708-019B960494DF}">
-                <a14:hiddenLine xmlns="" xmlns:a14="http://schemas.microsoft.com/office/drawing/2010/main" w="9525">
+                <a14:hiddenLine xmlns:a14="http://schemas.microsoft.com/office/drawing/2010/main" xmlns="" w="9525">
                   <a:solidFill>
                     <a:srgbClr val="000000"/>
                   </a:solidFill>
@@ -2344,7 +2366,7 @@
             </a:ln>
             <a:extLst>
               <a:ext uri="{91240B29-F687-4f45-9708-019B960494DF}">
-                <a14:hiddenLine xmlns="" xmlns:a14="http://schemas.microsoft.com/office/drawing/2010/main" w="9525">
+                <a14:hiddenLine xmlns:a14="http://schemas.microsoft.com/office/drawing/2010/main" xmlns="" w="9525">
                   <a:solidFill>
                     <a:srgbClr val="000000"/>
                   </a:solidFill>
@@ -2434,7 +2456,7 @@
             </a:ln>
             <a:extLst>
               <a:ext uri="{91240B29-F687-4f45-9708-019B960494DF}">
-                <a14:hiddenLine xmlns="" xmlns:a14="http://schemas.microsoft.com/office/drawing/2010/main" w="9525">
+                <a14:hiddenLine xmlns:a14="http://schemas.microsoft.com/office/drawing/2010/main" xmlns="" w="9525">
                   <a:solidFill>
                     <a:srgbClr val="000000"/>
                   </a:solidFill>
@@ -2496,7 +2518,7 @@
             </a:ln>
             <a:extLst>
               <a:ext uri="{91240B29-F687-4f45-9708-019B960494DF}">
-                <a14:hiddenLine xmlns="" xmlns:a14="http://schemas.microsoft.com/office/drawing/2010/main" w="9525">
+                <a14:hiddenLine xmlns:a14="http://schemas.microsoft.com/office/drawing/2010/main" xmlns="" w="9525">
                   <a:solidFill>
                     <a:srgbClr val="000000"/>
                   </a:solidFill>
@@ -2558,7 +2580,7 @@
             </a:ln>
             <a:extLst>
               <a:ext uri="{91240B29-F687-4f45-9708-019B960494DF}">
-                <a14:hiddenLine xmlns="" xmlns:a14="http://schemas.microsoft.com/office/drawing/2010/main" w="9525">
+                <a14:hiddenLine xmlns:a14="http://schemas.microsoft.com/office/drawing/2010/main" xmlns="" w="9525">
                   <a:solidFill>
                     <a:srgbClr val="000000"/>
                   </a:solidFill>
@@ -2648,7 +2670,7 @@
             </a:ln>
             <a:extLst>
               <a:ext uri="{91240B29-F687-4f45-9708-019B960494DF}">
-                <a14:hiddenLine xmlns="" xmlns:a14="http://schemas.microsoft.com/office/drawing/2010/main" w="9525">
+                <a14:hiddenLine xmlns:a14="http://schemas.microsoft.com/office/drawing/2010/main" xmlns="" w="9525">
                   <a:solidFill>
                     <a:srgbClr val="000000"/>
                   </a:solidFill>
@@ -2716,7 +2738,7 @@
             </a:ln>
             <a:extLst>
               <a:ext uri="{91240B29-F687-4f45-9708-019B960494DF}">
-                <a14:hiddenLine xmlns="" xmlns:a14="http://schemas.microsoft.com/office/drawing/2010/main" w="9525">
+                <a14:hiddenLine xmlns:a14="http://schemas.microsoft.com/office/drawing/2010/main" xmlns="" w="9525">
                   <a:solidFill>
                     <a:srgbClr val="000000"/>
                   </a:solidFill>
@@ -2778,7 +2800,7 @@
             </a:ln>
             <a:extLst>
               <a:ext uri="{91240B29-F687-4f45-9708-019B960494DF}">
-                <a14:hiddenLine xmlns="" xmlns:a14="http://schemas.microsoft.com/office/drawing/2010/main" w="9525">
+                <a14:hiddenLine xmlns:a14="http://schemas.microsoft.com/office/drawing/2010/main" xmlns="" w="9525">
                   <a:solidFill>
                     <a:srgbClr val="000000"/>
                   </a:solidFill>
@@ -2868,7 +2890,7 @@
             </a:ln>
             <a:extLst>
               <a:ext uri="{91240B29-F687-4f45-9708-019B960494DF}">
-                <a14:hiddenLine xmlns="" xmlns:a14="http://schemas.microsoft.com/office/drawing/2010/main" w="9525">
+                <a14:hiddenLine xmlns:a14="http://schemas.microsoft.com/office/drawing/2010/main" xmlns="" w="9525">
                   <a:solidFill>
                     <a:srgbClr val="000000"/>
                   </a:solidFill>
@@ -2930,7 +2952,7 @@
             </a:ln>
             <a:extLst>
               <a:ext uri="{91240B29-F687-4f45-9708-019B960494DF}">
-                <a14:hiddenLine xmlns="" xmlns:a14="http://schemas.microsoft.com/office/drawing/2010/main" w="9525">
+                <a14:hiddenLine xmlns:a14="http://schemas.microsoft.com/office/drawing/2010/main" xmlns="" w="9525">
                   <a:solidFill>
                     <a:srgbClr val="000000"/>
                   </a:solidFill>
@@ -3020,7 +3042,7 @@
             </a:ln>
             <a:extLst>
               <a:ext uri="{91240B29-F687-4f45-9708-019B960494DF}">
-                <a14:hiddenLine xmlns="" xmlns:a14="http://schemas.microsoft.com/office/drawing/2010/main" w="9525">
+                <a14:hiddenLine xmlns:a14="http://schemas.microsoft.com/office/drawing/2010/main" xmlns="" w="9525">
                   <a:solidFill>
                     <a:srgbClr val="000000"/>
                   </a:solidFill>
@@ -3082,7 +3104,7 @@
             </a:ln>
             <a:extLst>
               <a:ext uri="{91240B29-F687-4f45-9708-019B960494DF}">
-                <a14:hiddenLine xmlns="" xmlns:a14="http://schemas.microsoft.com/office/drawing/2010/main" w="9525">
+                <a14:hiddenLine xmlns:a14="http://schemas.microsoft.com/office/drawing/2010/main" xmlns="" w="9525">
                   <a:solidFill>
                     <a:srgbClr val="000000"/>
                   </a:solidFill>
@@ -3172,7 +3194,7 @@
             </a:ln>
             <a:extLst>
               <a:ext uri="{91240B29-F687-4f45-9708-019B960494DF}">
-                <a14:hiddenLine xmlns="" xmlns:a14="http://schemas.microsoft.com/office/drawing/2010/main" w="9525">
+                <a14:hiddenLine xmlns:a14="http://schemas.microsoft.com/office/drawing/2010/main" xmlns="" w="9525">
                   <a:solidFill>
                     <a:srgbClr val="000000"/>
                   </a:solidFill>
@@ -3206,7 +3228,7 @@
             </a:ln>
             <a:extLst>
               <a:ext uri="{91240B29-F687-4f45-9708-019B960494DF}">
-                <a14:hiddenLine xmlns="" xmlns:a14="http://schemas.microsoft.com/office/drawing/2010/main" w="9525">
+                <a14:hiddenLine xmlns:a14="http://schemas.microsoft.com/office/drawing/2010/main" xmlns="" w="9525">
                   <a:solidFill>
                     <a:srgbClr val="000000"/>
                   </a:solidFill>
@@ -3271,7 +3293,7 @@
             </a:ln>
             <a:extLst>
               <a:ext uri="{91240B29-F687-4f45-9708-019B960494DF}">
-                <a14:hiddenLine xmlns="" xmlns:a14="http://schemas.microsoft.com/office/drawing/2010/main" w="9525">
+                <a14:hiddenLine xmlns:a14="http://schemas.microsoft.com/office/drawing/2010/main" xmlns="" w="9525">
                   <a:solidFill>
                     <a:srgbClr val="000000"/>
                   </a:solidFill>
@@ -3361,7 +3383,7 @@
             </a:ln>
             <a:extLst>
               <a:ext uri="{91240B29-F687-4f45-9708-019B960494DF}">
-                <a14:hiddenLine xmlns="" xmlns:a14="http://schemas.microsoft.com/office/drawing/2010/main" w="9525">
+                <a14:hiddenLine xmlns:a14="http://schemas.microsoft.com/office/drawing/2010/main" xmlns="" w="9525">
                   <a:solidFill>
                     <a:srgbClr val="000000"/>
                   </a:solidFill>
@@ -3423,7 +3445,7 @@
             </a:ln>
             <a:extLst>
               <a:ext uri="{91240B29-F687-4f45-9708-019B960494DF}">
-                <a14:hiddenLine xmlns="" xmlns:a14="http://schemas.microsoft.com/office/drawing/2010/main" w="9525">
+                <a14:hiddenLine xmlns:a14="http://schemas.microsoft.com/office/drawing/2010/main" xmlns="" w="9525">
                   <a:solidFill>
                     <a:srgbClr val="000000"/>
                   </a:solidFill>
@@ -3513,7 +3535,7 @@
             </a:ln>
             <a:extLst>
               <a:ext uri="{91240B29-F687-4f45-9708-019B960494DF}">
-                <a14:hiddenLine xmlns="" xmlns:a14="http://schemas.microsoft.com/office/drawing/2010/main" w="9525">
+                <a14:hiddenLine xmlns:a14="http://schemas.microsoft.com/office/drawing/2010/main" xmlns="" w="9525">
                   <a:solidFill>
                     <a:srgbClr val="000000"/>
                   </a:solidFill>
@@ -3603,7 +3625,7 @@
             </a:ln>
             <a:extLst>
               <a:ext uri="{91240B29-F687-4f45-9708-019B960494DF}">
-                <a14:hiddenLine xmlns="" xmlns:a14="http://schemas.microsoft.com/office/drawing/2010/main" w="9525">
+                <a14:hiddenLine xmlns:a14="http://schemas.microsoft.com/office/drawing/2010/main" xmlns="" w="9525">
                   <a:solidFill>
                     <a:srgbClr val="000000"/>
                   </a:solidFill>
@@ -3668,7 +3690,7 @@
             </a:ln>
             <a:extLst>
               <a:ext uri="{91240B29-F687-4f45-9708-019B960494DF}">
-                <a14:hiddenLine xmlns="" xmlns:a14="http://schemas.microsoft.com/office/drawing/2010/main" w="9525">
+                <a14:hiddenLine xmlns:a14="http://schemas.microsoft.com/office/drawing/2010/main" xmlns="" w="9525">
                   <a:solidFill>
                     <a:srgbClr val="000000"/>
                   </a:solidFill>
@@ -3730,7 +3752,7 @@
             </a:ln>
             <a:extLst>
               <a:ext uri="{91240B29-F687-4f45-9708-019B960494DF}">
-                <a14:hiddenLine xmlns="" xmlns:a14="http://schemas.microsoft.com/office/drawing/2010/main" w="9525">
+                <a14:hiddenLine xmlns:a14="http://schemas.microsoft.com/office/drawing/2010/main" xmlns="" w="9525">
                   <a:solidFill>
                     <a:srgbClr val="000000"/>
                   </a:solidFill>
@@ -3820,7 +3842,7 @@
             </a:ln>
             <a:extLst>
               <a:ext uri="{91240B29-F687-4f45-9708-019B960494DF}">
-                <a14:hiddenLine xmlns="" xmlns:a14="http://schemas.microsoft.com/office/drawing/2010/main" w="9525">
+                <a14:hiddenLine xmlns:a14="http://schemas.microsoft.com/office/drawing/2010/main" xmlns="" w="9525">
                   <a:solidFill>
                     <a:srgbClr val="000000"/>
                   </a:solidFill>
@@ -3910,7 +3932,7 @@
             </a:ln>
             <a:extLst>
               <a:ext uri="{91240B29-F687-4f45-9708-019B960494DF}">
-                <a14:hiddenLine xmlns="" xmlns:a14="http://schemas.microsoft.com/office/drawing/2010/main" w="9525">
+                <a14:hiddenLine xmlns:a14="http://schemas.microsoft.com/office/drawing/2010/main" xmlns="" w="9525">
                   <a:solidFill>
                     <a:srgbClr val="000000"/>
                   </a:solidFill>
@@ -3972,7 +3994,7 @@
             </a:ln>
             <a:extLst>
               <a:ext uri="{91240B29-F687-4f45-9708-019B960494DF}">
-                <a14:hiddenLine xmlns="" xmlns:a14="http://schemas.microsoft.com/office/drawing/2010/main" w="9525">
+                <a14:hiddenLine xmlns:a14="http://schemas.microsoft.com/office/drawing/2010/main" xmlns="" w="9525">
                   <a:solidFill>
                     <a:srgbClr val="000000"/>
                   </a:solidFill>
@@ -4092,7 +4114,7 @@
             </a:ln>
             <a:extLst>
               <a:ext uri="{91240B29-F687-4f45-9708-019B960494DF}">
-                <a14:hiddenLine xmlns="" xmlns:a14="http://schemas.microsoft.com/office/drawing/2010/main" w="9525">
+                <a14:hiddenLine xmlns:a14="http://schemas.microsoft.com/office/drawing/2010/main" xmlns="" w="9525">
                   <a:solidFill>
                     <a:srgbClr val="000000"/>
                   </a:solidFill>
@@ -4160,7 +4182,7 @@
             </a:ln>
             <a:extLst>
               <a:ext uri="{91240B29-F687-4f45-9708-019B960494DF}">
-                <a14:hiddenLine xmlns="" xmlns:a14="http://schemas.microsoft.com/office/drawing/2010/main" w="9525">
+                <a14:hiddenLine xmlns:a14="http://schemas.microsoft.com/office/drawing/2010/main" xmlns="" w="9525">
                   <a:solidFill>
                     <a:srgbClr val="000000"/>
                   </a:solidFill>
@@ -4250,7 +4272,7 @@
             </a:ln>
             <a:extLst>
               <a:ext uri="{91240B29-F687-4f45-9708-019B960494DF}">
-                <a14:hiddenLine xmlns="" xmlns:a14="http://schemas.microsoft.com/office/drawing/2010/main" w="9525">
+                <a14:hiddenLine xmlns:a14="http://schemas.microsoft.com/office/drawing/2010/main" xmlns="" w="9525">
                   <a:solidFill>
                     <a:srgbClr val="000000"/>
                   </a:solidFill>
@@ -4390,7 +4412,7 @@
           <a:p>
             <a:fld id="{841D4EFB-1649-4F74-89D1-9FCA056B78EF}" type="datetimeFigureOut">
               <a:rPr lang="en-US" smtClean="0"/>
-              <a:t>11/27/2014</a:t>
+              <a:t>11/29/2014</a:t>
             </a:fld>
             <a:endParaRPr lang="en-US"/>
           </a:p>
@@ -4657,7 +4679,7 @@
           <a:p>
             <a:fld id="{841D4EFB-1649-4F74-89D1-9FCA056B78EF}" type="datetimeFigureOut">
               <a:rPr lang="en-US" smtClean="0"/>
-              <a:t>11/27/2014</a:t>
+              <a:t>11/29/2014</a:t>
             </a:fld>
             <a:endParaRPr lang="en-US"/>
           </a:p>
@@ -4853,7 +4875,7 @@
           <a:p>
             <a:fld id="{841D4EFB-1649-4F74-89D1-9FCA056B78EF}" type="datetimeFigureOut">
               <a:rPr lang="en-US" smtClean="0"/>
-              <a:t>11/27/2014</a:t>
+              <a:t>11/29/2014</a:t>
             </a:fld>
             <a:endParaRPr lang="en-US"/>
           </a:p>
@@ -5116,7 +5138,7 @@
           <a:p>
             <a:fld id="{841D4EFB-1649-4F74-89D1-9FCA056B78EF}" type="datetimeFigureOut">
               <a:rPr lang="en-US" smtClean="0"/>
-              <a:t>11/27/2014</a:t>
+              <a:t>11/29/2014</a:t>
             </a:fld>
             <a:endParaRPr lang="en-US"/>
           </a:p>
@@ -5550,7 +5572,7 @@
           <a:p>
             <a:fld id="{841D4EFB-1649-4F74-89D1-9FCA056B78EF}" type="datetimeFigureOut">
               <a:rPr lang="en-US" smtClean="0"/>
-              <a:t>11/27/2014</a:t>
+              <a:t>11/29/2014</a:t>
             </a:fld>
             <a:endParaRPr lang="en-US"/>
           </a:p>
@@ -6096,7 +6118,7 @@
           <a:p>
             <a:fld id="{841D4EFB-1649-4F74-89D1-9FCA056B78EF}" type="datetimeFigureOut">
               <a:rPr lang="en-US" smtClean="0"/>
-              <a:t>11/27/2014</a:t>
+              <a:t>11/29/2014</a:t>
             </a:fld>
             <a:endParaRPr lang="en-US"/>
           </a:p>
@@ -6816,7 +6838,7 @@
           <a:p>
             <a:fld id="{841D4EFB-1649-4F74-89D1-9FCA056B78EF}" type="datetimeFigureOut">
               <a:rPr lang="en-US" smtClean="0"/>
-              <a:t>11/27/2014</a:t>
+              <a:t>11/29/2014</a:t>
             </a:fld>
             <a:endParaRPr lang="en-US"/>
           </a:p>
@@ -6986,7 +7008,7 @@
           <a:p>
             <a:fld id="{841D4EFB-1649-4F74-89D1-9FCA056B78EF}" type="datetimeFigureOut">
               <a:rPr lang="en-US" smtClean="0"/>
-              <a:t>11/27/2014</a:t>
+              <a:t>11/29/2014</a:t>
             </a:fld>
             <a:endParaRPr lang="en-US"/>
           </a:p>
@@ -7166,7 +7188,7 @@
           <a:p>
             <a:fld id="{841D4EFB-1649-4F74-89D1-9FCA056B78EF}" type="datetimeFigureOut">
               <a:rPr lang="en-US" smtClean="0"/>
-              <a:t>11/27/2014</a:t>
+              <a:t>11/29/2014</a:t>
             </a:fld>
             <a:endParaRPr lang="en-US"/>
           </a:p>
@@ -7336,7 +7358,7 @@
           <a:p>
             <a:fld id="{841D4EFB-1649-4F74-89D1-9FCA056B78EF}" type="datetimeFigureOut">
               <a:rPr lang="en-US" smtClean="0"/>
-              <a:t>11/27/2014</a:t>
+              <a:t>11/29/2014</a:t>
             </a:fld>
             <a:endParaRPr lang="en-US"/>
           </a:p>
@@ -7586,7 +7608,7 @@
           <a:p>
             <a:fld id="{841D4EFB-1649-4F74-89D1-9FCA056B78EF}" type="datetimeFigureOut">
               <a:rPr lang="en-US" smtClean="0"/>
-              <a:t>11/27/2014</a:t>
+              <a:t>11/29/2014</a:t>
             </a:fld>
             <a:endParaRPr lang="en-US"/>
           </a:p>
@@ -7818,7 +7840,7 @@
           <a:p>
             <a:fld id="{841D4EFB-1649-4F74-89D1-9FCA056B78EF}" type="datetimeFigureOut">
               <a:rPr lang="en-US" smtClean="0"/>
-              <a:t>11/27/2014</a:t>
+              <a:t>11/29/2014</a:t>
             </a:fld>
             <a:endParaRPr lang="en-US"/>
           </a:p>
@@ -8199,7 +8221,7 @@
           <a:p>
             <a:fld id="{841D4EFB-1649-4F74-89D1-9FCA056B78EF}" type="datetimeFigureOut">
               <a:rPr lang="en-US" smtClean="0"/>
-              <a:t>11/27/2014</a:t>
+              <a:t>11/29/2014</a:t>
             </a:fld>
             <a:endParaRPr lang="en-US"/>
           </a:p>
@@ -8317,7 +8339,7 @@
           <a:p>
             <a:fld id="{841D4EFB-1649-4F74-89D1-9FCA056B78EF}" type="datetimeFigureOut">
               <a:rPr lang="en-US" smtClean="0"/>
-              <a:t>11/27/2014</a:t>
+              <a:t>11/29/2014</a:t>
             </a:fld>
             <a:endParaRPr lang="en-US"/>
           </a:p>
@@ -8412,7 +8434,7 @@
           <a:p>
             <a:fld id="{841D4EFB-1649-4F74-89D1-9FCA056B78EF}" type="datetimeFigureOut">
               <a:rPr lang="en-US" smtClean="0"/>
-              <a:t>11/27/2014</a:t>
+              <a:t>11/29/2014</a:t>
             </a:fld>
             <a:endParaRPr lang="en-US"/>
           </a:p>
@@ -8661,7 +8683,7 @@
           <a:p>
             <a:fld id="{841D4EFB-1649-4F74-89D1-9FCA056B78EF}" type="datetimeFigureOut">
               <a:rPr lang="en-US" smtClean="0"/>
-              <a:t>11/27/2014</a:t>
+              <a:t>11/29/2014</a:t>
             </a:fld>
             <a:endParaRPr lang="en-US"/>
           </a:p>
@@ -8941,7 +8963,7 @@
           <a:p>
             <a:fld id="{841D4EFB-1649-4F74-89D1-9FCA056B78EF}" type="datetimeFigureOut">
               <a:rPr lang="en-US" smtClean="0"/>
-              <a:t>11/27/2014</a:t>
+              <a:t>11/29/2014</a:t>
             </a:fld>
             <a:endParaRPr lang="en-US"/>
           </a:p>
@@ -9057,7 +9079,7 @@
           <a:noFill/>
           <a:extLst>
             <a:ext uri="{909E8E84-426E-40dd-AFC4-6F175D3DCCD1}">
-              <a14:hiddenFill xmlns="" xmlns:a14="http://schemas.microsoft.com/office/drawing/2010/main">
+              <a14:hiddenFill xmlns:a14="http://schemas.microsoft.com/office/drawing/2010/main" xmlns="">
                 <a:solidFill>
                   <a:srgbClr val="FFFFFF"/>
                 </a:solidFill>
@@ -9131,7 +9153,7 @@
               </a:ln>
               <a:extLst>
                 <a:ext uri="{91240B29-F687-4f45-9708-019B960494DF}">
-                  <a14:hiddenLine xmlns="" xmlns:a14="http://schemas.microsoft.com/office/drawing/2010/main" w="9525">
+                  <a14:hiddenLine xmlns:a14="http://schemas.microsoft.com/office/drawing/2010/main" xmlns="" w="9525">
                     <a:solidFill>
                       <a:srgbClr val="000000"/>
                     </a:solidFill>
@@ -9221,7 +9243,7 @@
               </a:ln>
               <a:extLst>
                 <a:ext uri="{91240B29-F687-4f45-9708-019B960494DF}">
-                  <a14:hiddenLine xmlns="" xmlns:a14="http://schemas.microsoft.com/office/drawing/2010/main" w="9525">
+                  <a14:hiddenLine xmlns:a14="http://schemas.microsoft.com/office/drawing/2010/main" xmlns="" w="9525">
                     <a:solidFill>
                       <a:srgbClr val="000000"/>
                     </a:solidFill>
@@ -9311,7 +9333,7 @@
               </a:ln>
               <a:extLst>
                 <a:ext uri="{91240B29-F687-4f45-9708-019B960494DF}">
-                  <a14:hiddenLine xmlns="" xmlns:a14="http://schemas.microsoft.com/office/drawing/2010/main" w="9525">
+                  <a14:hiddenLine xmlns:a14="http://schemas.microsoft.com/office/drawing/2010/main" xmlns="" w="9525">
                     <a:solidFill>
                       <a:srgbClr val="000000"/>
                     </a:solidFill>
@@ -9373,7 +9395,7 @@
               </a:ln>
               <a:extLst>
                 <a:ext uri="{91240B29-F687-4f45-9708-019B960494DF}">
-                  <a14:hiddenLine xmlns="" xmlns:a14="http://schemas.microsoft.com/office/drawing/2010/main" w="9525">
+                  <a14:hiddenLine xmlns:a14="http://schemas.microsoft.com/office/drawing/2010/main" xmlns="" w="9525">
                     <a:solidFill>
                       <a:srgbClr val="000000"/>
                     </a:solidFill>
@@ -9463,7 +9485,7 @@
               </a:ln>
               <a:extLst>
                 <a:ext uri="{91240B29-F687-4f45-9708-019B960494DF}">
-                  <a14:hiddenLine xmlns="" xmlns:a14="http://schemas.microsoft.com/office/drawing/2010/main" w="9525">
+                  <a14:hiddenLine xmlns:a14="http://schemas.microsoft.com/office/drawing/2010/main" xmlns="" w="9525">
                     <a:solidFill>
                       <a:srgbClr val="000000"/>
                     </a:solidFill>
@@ -9525,7 +9547,7 @@
               </a:ln>
               <a:extLst>
                 <a:ext uri="{91240B29-F687-4f45-9708-019B960494DF}">
-                  <a14:hiddenLine xmlns="" xmlns:a14="http://schemas.microsoft.com/office/drawing/2010/main" w="9525">
+                  <a14:hiddenLine xmlns:a14="http://schemas.microsoft.com/office/drawing/2010/main" xmlns="" w="9525">
                     <a:solidFill>
                       <a:srgbClr val="000000"/>
                     </a:solidFill>
@@ -9587,7 +9609,7 @@
               </a:ln>
               <a:extLst>
                 <a:ext uri="{91240B29-F687-4f45-9708-019B960494DF}">
-                  <a14:hiddenLine xmlns="" xmlns:a14="http://schemas.microsoft.com/office/drawing/2010/main" w="9525">
+                  <a14:hiddenLine xmlns:a14="http://schemas.microsoft.com/office/drawing/2010/main" xmlns="" w="9525">
                     <a:solidFill>
                       <a:srgbClr val="000000"/>
                     </a:solidFill>
@@ -9677,7 +9699,7 @@
               </a:ln>
               <a:extLst>
                 <a:ext uri="{91240B29-F687-4f45-9708-019B960494DF}">
-                  <a14:hiddenLine xmlns="" xmlns:a14="http://schemas.microsoft.com/office/drawing/2010/main" w="9525">
+                  <a14:hiddenLine xmlns:a14="http://schemas.microsoft.com/office/drawing/2010/main" xmlns="" w="9525">
                     <a:solidFill>
                       <a:srgbClr val="000000"/>
                     </a:solidFill>
@@ -9767,7 +9789,7 @@
               </a:ln>
               <a:extLst>
                 <a:ext uri="{91240B29-F687-4f45-9708-019B960494DF}">
-                  <a14:hiddenLine xmlns="" xmlns:a14="http://schemas.microsoft.com/office/drawing/2010/main" w="9525">
+                  <a14:hiddenLine xmlns:a14="http://schemas.microsoft.com/office/drawing/2010/main" xmlns="" w="9525">
                     <a:solidFill>
                       <a:srgbClr val="000000"/>
                     </a:solidFill>
@@ -9829,7 +9851,7 @@
               </a:ln>
               <a:extLst>
                 <a:ext uri="{91240B29-F687-4f45-9708-019B960494DF}">
-                  <a14:hiddenLine xmlns="" xmlns:a14="http://schemas.microsoft.com/office/drawing/2010/main" w="9525">
+                  <a14:hiddenLine xmlns:a14="http://schemas.microsoft.com/office/drawing/2010/main" xmlns="" w="9525">
                     <a:solidFill>
                       <a:srgbClr val="000000"/>
                     </a:solidFill>
@@ -9939,7 +9961,7 @@
               </a:ln>
               <a:extLst>
                 <a:ext uri="{91240B29-F687-4f45-9708-019B960494DF}">
-                  <a14:hiddenLine xmlns="" xmlns:a14="http://schemas.microsoft.com/office/drawing/2010/main" w="9525">
+                  <a14:hiddenLine xmlns:a14="http://schemas.microsoft.com/office/drawing/2010/main" xmlns="" w="9525">
                     <a:solidFill>
                       <a:srgbClr val="000000"/>
                     </a:solidFill>
@@ -10023,7 +10045,7 @@
               </a:ln>
               <a:extLst>
                 <a:ext uri="{91240B29-F687-4f45-9708-019B960494DF}">
-                  <a14:hiddenLine xmlns="" xmlns:a14="http://schemas.microsoft.com/office/drawing/2010/main" w="9525">
+                  <a14:hiddenLine xmlns:a14="http://schemas.microsoft.com/office/drawing/2010/main" xmlns="" w="9525">
                     <a:solidFill>
                       <a:srgbClr val="000000"/>
                     </a:solidFill>
@@ -10085,7 +10107,7 @@
               </a:ln>
               <a:extLst>
                 <a:ext uri="{91240B29-F687-4f45-9708-019B960494DF}">
-                  <a14:hiddenLine xmlns="" xmlns:a14="http://schemas.microsoft.com/office/drawing/2010/main" w="9525">
+                  <a14:hiddenLine xmlns:a14="http://schemas.microsoft.com/office/drawing/2010/main" xmlns="" w="9525">
                     <a:solidFill>
                       <a:srgbClr val="000000"/>
                     </a:solidFill>
@@ -10147,7 +10169,7 @@
               </a:ln>
               <a:extLst>
                 <a:ext uri="{91240B29-F687-4f45-9708-019B960494DF}">
-                  <a14:hiddenLine xmlns="" xmlns:a14="http://schemas.microsoft.com/office/drawing/2010/main" w="9525">
+                  <a14:hiddenLine xmlns:a14="http://schemas.microsoft.com/office/drawing/2010/main" xmlns="" w="9525">
                     <a:solidFill>
                       <a:srgbClr val="000000"/>
                     </a:solidFill>
@@ -10237,7 +10259,7 @@
               </a:ln>
               <a:extLst>
                 <a:ext uri="{91240B29-F687-4f45-9708-019B960494DF}">
-                  <a14:hiddenLine xmlns="" xmlns:a14="http://schemas.microsoft.com/office/drawing/2010/main" w="9525">
+                  <a14:hiddenLine xmlns:a14="http://schemas.microsoft.com/office/drawing/2010/main" xmlns="" w="9525">
                     <a:solidFill>
                       <a:srgbClr val="000000"/>
                     </a:solidFill>
@@ -10271,7 +10293,7 @@
               </a:ln>
               <a:extLst>
                 <a:ext uri="{91240B29-F687-4f45-9708-019B960494DF}">
-                  <a14:hiddenLine xmlns="" xmlns:a14="http://schemas.microsoft.com/office/drawing/2010/main" w="9525">
+                  <a14:hiddenLine xmlns:a14="http://schemas.microsoft.com/office/drawing/2010/main" xmlns="" w="9525">
                     <a:solidFill>
                       <a:srgbClr val="000000"/>
                     </a:solidFill>
@@ -10336,7 +10358,7 @@
               </a:ln>
               <a:extLst>
                 <a:ext uri="{91240B29-F687-4f45-9708-019B960494DF}">
-                  <a14:hiddenLine xmlns="" xmlns:a14="http://schemas.microsoft.com/office/drawing/2010/main" w="9525">
+                  <a14:hiddenLine xmlns:a14="http://schemas.microsoft.com/office/drawing/2010/main" xmlns="" w="9525">
                     <a:solidFill>
                       <a:srgbClr val="000000"/>
                     </a:solidFill>
@@ -10426,7 +10448,7 @@
               </a:ln>
               <a:extLst>
                 <a:ext uri="{91240B29-F687-4f45-9708-019B960494DF}">
-                  <a14:hiddenLine xmlns="" xmlns:a14="http://schemas.microsoft.com/office/drawing/2010/main" w="9525">
+                  <a14:hiddenLine xmlns:a14="http://schemas.microsoft.com/office/drawing/2010/main" xmlns="" w="9525">
                     <a:solidFill>
                       <a:srgbClr val="000000"/>
                     </a:solidFill>
@@ -10488,7 +10510,7 @@
               </a:ln>
               <a:extLst>
                 <a:ext uri="{91240B29-F687-4f45-9708-019B960494DF}">
-                  <a14:hiddenLine xmlns="" xmlns:a14="http://schemas.microsoft.com/office/drawing/2010/main" w="9525">
+                  <a14:hiddenLine xmlns:a14="http://schemas.microsoft.com/office/drawing/2010/main" xmlns="" w="9525">
                     <a:solidFill>
                       <a:srgbClr val="000000"/>
                     </a:solidFill>
@@ -10578,7 +10600,7 @@
               </a:ln>
               <a:extLst>
                 <a:ext uri="{91240B29-F687-4f45-9708-019B960494DF}">
-                  <a14:hiddenLine xmlns="" xmlns:a14="http://schemas.microsoft.com/office/drawing/2010/main" w="9525">
+                  <a14:hiddenLine xmlns:a14="http://schemas.microsoft.com/office/drawing/2010/main" xmlns="" w="9525">
                     <a:solidFill>
                       <a:srgbClr val="000000"/>
                     </a:solidFill>
@@ -10643,7 +10665,7 @@
               </a:ln>
               <a:extLst>
                 <a:ext uri="{91240B29-F687-4f45-9708-019B960494DF}">
-                  <a14:hiddenLine xmlns="" xmlns:a14="http://schemas.microsoft.com/office/drawing/2010/main" w="9525">
+                  <a14:hiddenLine xmlns:a14="http://schemas.microsoft.com/office/drawing/2010/main" xmlns="" w="9525">
                     <a:solidFill>
                       <a:srgbClr val="000000"/>
                     </a:solidFill>
@@ -10705,7 +10727,7 @@
               </a:ln>
               <a:extLst>
                 <a:ext uri="{91240B29-F687-4f45-9708-019B960494DF}">
-                  <a14:hiddenLine xmlns="" xmlns:a14="http://schemas.microsoft.com/office/drawing/2010/main" w="9525">
+                  <a14:hiddenLine xmlns:a14="http://schemas.microsoft.com/office/drawing/2010/main" xmlns="" w="9525">
                     <a:solidFill>
                       <a:srgbClr val="000000"/>
                     </a:solidFill>
@@ -10795,7 +10817,7 @@
               </a:ln>
               <a:extLst>
                 <a:ext uri="{91240B29-F687-4f45-9708-019B960494DF}">
-                  <a14:hiddenLine xmlns="" xmlns:a14="http://schemas.microsoft.com/office/drawing/2010/main" w="9525">
+                  <a14:hiddenLine xmlns:a14="http://schemas.microsoft.com/office/drawing/2010/main" xmlns="" w="9525">
                     <a:solidFill>
                       <a:srgbClr val="000000"/>
                     </a:solidFill>
@@ -10885,7 +10907,7 @@
               </a:ln>
               <a:extLst>
                 <a:ext uri="{91240B29-F687-4f45-9708-019B960494DF}">
-                  <a14:hiddenLine xmlns="" xmlns:a14="http://schemas.microsoft.com/office/drawing/2010/main" w="9525">
+                  <a14:hiddenLine xmlns:a14="http://schemas.microsoft.com/office/drawing/2010/main" xmlns="" w="9525">
                     <a:solidFill>
                       <a:srgbClr val="000000"/>
                     </a:solidFill>
@@ -10950,7 +10972,7 @@
               </a:ln>
               <a:extLst>
                 <a:ext uri="{91240B29-F687-4f45-9708-019B960494DF}">
-                  <a14:hiddenLine xmlns="" xmlns:a14="http://schemas.microsoft.com/office/drawing/2010/main" w="9525">
+                  <a14:hiddenLine xmlns:a14="http://schemas.microsoft.com/office/drawing/2010/main" xmlns="" w="9525">
                     <a:solidFill>
                       <a:srgbClr val="000000"/>
                     </a:solidFill>
@@ -11070,7 +11092,7 @@
               </a:ln>
               <a:extLst>
                 <a:ext uri="{91240B29-F687-4f45-9708-019B960494DF}">
-                  <a14:hiddenLine xmlns="" xmlns:a14="http://schemas.microsoft.com/office/drawing/2010/main" w="9525">
+                  <a14:hiddenLine xmlns:a14="http://schemas.microsoft.com/office/drawing/2010/main" xmlns="" w="9525">
                     <a:solidFill>
                       <a:srgbClr val="000000"/>
                     </a:solidFill>
@@ -11168,7 +11190,7 @@
               </a:ln>
               <a:extLst>
                 <a:ext uri="{91240B29-F687-4f45-9708-019B960494DF}">
-                  <a14:hiddenLine xmlns="" xmlns:a14="http://schemas.microsoft.com/office/drawing/2010/main" w="9525">
+                  <a14:hiddenLine xmlns:a14="http://schemas.microsoft.com/office/drawing/2010/main" xmlns="" w="9525">
                     <a:solidFill>
                       <a:srgbClr val="000000"/>
                     </a:solidFill>
@@ -11283,7 +11305,7 @@
               </a:ln>
               <a:extLst>
                 <a:ext uri="{91240B29-F687-4f45-9708-019B960494DF}">
-                  <a14:hiddenLine xmlns="" xmlns:a14="http://schemas.microsoft.com/office/drawing/2010/main" w="9525">
+                  <a14:hiddenLine xmlns:a14="http://schemas.microsoft.com/office/drawing/2010/main" xmlns="" w="9525">
                     <a:solidFill>
                       <a:srgbClr val="000000"/>
                     </a:solidFill>
@@ -11373,7 +11395,7 @@
               </a:ln>
               <a:extLst>
                 <a:ext uri="{91240B29-F687-4f45-9708-019B960494DF}">
-                  <a14:hiddenLine xmlns="" xmlns:a14="http://schemas.microsoft.com/office/drawing/2010/main" w="9525">
+                  <a14:hiddenLine xmlns:a14="http://schemas.microsoft.com/office/drawing/2010/main" xmlns="" w="9525">
                     <a:solidFill>
                       <a:srgbClr val="000000"/>
                     </a:solidFill>
@@ -11438,7 +11460,7 @@
               </a:ln>
               <a:extLst>
                 <a:ext uri="{91240B29-F687-4f45-9708-019B960494DF}">
-                  <a14:hiddenLine xmlns="" xmlns:a14="http://schemas.microsoft.com/office/drawing/2010/main" w="9525">
+                  <a14:hiddenLine xmlns:a14="http://schemas.microsoft.com/office/drawing/2010/main" xmlns="" w="9525">
                     <a:solidFill>
                       <a:srgbClr val="000000"/>
                     </a:solidFill>
@@ -11528,7 +11550,7 @@
               </a:ln>
               <a:extLst>
                 <a:ext uri="{91240B29-F687-4f45-9708-019B960494DF}">
-                  <a14:hiddenLine xmlns="" xmlns:a14="http://schemas.microsoft.com/office/drawing/2010/main" w="9525">
+                  <a14:hiddenLine xmlns:a14="http://schemas.microsoft.com/office/drawing/2010/main" xmlns="" w="9525">
                     <a:solidFill>
                       <a:srgbClr val="000000"/>
                     </a:solidFill>
@@ -11596,7 +11618,7 @@
               </a:ln>
               <a:extLst>
                 <a:ext uri="{91240B29-F687-4f45-9708-019B960494DF}">
-                  <a14:hiddenLine xmlns="" xmlns:a14="http://schemas.microsoft.com/office/drawing/2010/main" w="9525">
+                  <a14:hiddenLine xmlns:a14="http://schemas.microsoft.com/office/drawing/2010/main" xmlns="" w="9525">
                     <a:solidFill>
                       <a:srgbClr val="000000"/>
                     </a:solidFill>
@@ -11686,7 +11708,7 @@
               </a:ln>
               <a:extLst>
                 <a:ext uri="{91240B29-F687-4f45-9708-019B960494DF}">
-                  <a14:hiddenLine xmlns="" xmlns:a14="http://schemas.microsoft.com/office/drawing/2010/main" w="9525">
+                  <a14:hiddenLine xmlns:a14="http://schemas.microsoft.com/office/drawing/2010/main" xmlns="" w="9525">
                     <a:solidFill>
                       <a:srgbClr val="000000"/>
                     </a:solidFill>
@@ -11754,7 +11776,7 @@
               </a:ln>
               <a:extLst>
                 <a:ext uri="{91240B29-F687-4f45-9708-019B960494DF}">
-                  <a14:hiddenLine xmlns="" xmlns:a14="http://schemas.microsoft.com/office/drawing/2010/main" w="9525">
+                  <a14:hiddenLine xmlns:a14="http://schemas.microsoft.com/office/drawing/2010/main" xmlns="" w="9525">
                     <a:solidFill>
                       <a:srgbClr val="000000"/>
                     </a:solidFill>
@@ -11844,7 +11866,7 @@
               </a:ln>
               <a:extLst>
                 <a:ext uri="{91240B29-F687-4f45-9708-019B960494DF}">
-                  <a14:hiddenLine xmlns="" xmlns:a14="http://schemas.microsoft.com/office/drawing/2010/main" w="9525">
+                  <a14:hiddenLine xmlns:a14="http://schemas.microsoft.com/office/drawing/2010/main" xmlns="" w="9525">
                     <a:solidFill>
                       <a:srgbClr val="000000"/>
                     </a:solidFill>
@@ -11878,7 +11900,7 @@
               </a:ln>
               <a:extLst>
                 <a:ext uri="{91240B29-F687-4f45-9708-019B960494DF}">
-                  <a14:hiddenLine xmlns="" xmlns:a14="http://schemas.microsoft.com/office/drawing/2010/main" w="9525">
+                  <a14:hiddenLine xmlns:a14="http://schemas.microsoft.com/office/drawing/2010/main" xmlns="" w="9525">
                     <a:solidFill>
                       <a:srgbClr val="000000"/>
                     </a:solidFill>
@@ -12018,7 +12040,7 @@
           <a:p>
             <a:fld id="{841D4EFB-1649-4F74-89D1-9FCA056B78EF}" type="datetimeFigureOut">
               <a:rPr lang="en-US" smtClean="0"/>
-              <a:t>11/27/2014</a:t>
+              <a:t>11/29/2014</a:t>
             </a:fld>
             <a:endParaRPr lang="en-US"/>
           </a:p>
@@ -12491,6 +12513,1190 @@
 </p:sld>
 </file>
 
+<file path=ppt/slides/slide10.xml><?xml version="1.0" encoding="utf-8"?>
+<p:sld xmlns:a="http://schemas.openxmlformats.org/drawingml/2006/main" xmlns:r="http://schemas.openxmlformats.org/officeDocument/2006/relationships" xmlns:p="http://schemas.openxmlformats.org/presentationml/2006/main">
+  <p:cSld>
+    <p:spTree>
+      <p:nvGrpSpPr>
+        <p:cNvPr id="1" name=""/>
+        <p:cNvGrpSpPr/>
+        <p:nvPr/>
+      </p:nvGrpSpPr>
+      <p:grpSpPr>
+        <a:xfrm>
+          <a:off x="0" y="0"/>
+          <a:ext cx="0" cy="0"/>
+          <a:chOff x="0" y="0"/>
+          <a:chExt cx="0" cy="0"/>
+        </a:xfrm>
+      </p:grpSpPr>
+      <p:sp>
+        <p:nvSpPr>
+          <p:cNvPr id="2" name="Title 1"/>
+          <p:cNvSpPr>
+            <a:spLocks noGrp="1"/>
+          </p:cNvSpPr>
+          <p:nvPr>
+            <p:ph type="title"/>
+          </p:nvPr>
+        </p:nvSpPr>
+        <p:spPr/>
+        <p:txBody>
+          <a:bodyPr/>
+          <a:lstStyle/>
+          <a:p>
+            <a:pPr algn="ctr"/>
+            <a:r>
+              <a:rPr lang="bg-BG" dirty="0"/>
+              <a:t>Референтно представяне на</a:t>
+            </a:r>
+            <a:r>
+              <a:rPr lang="en-US" dirty="0"/>
+              <a:t/>
+            </a:r>
+            <a:br>
+              <a:rPr lang="en-US" dirty="0"/>
+            </a:br>
+            <a:r>
+              <a:rPr lang="bg-BG" dirty="0"/>
+              <a:t> примитивните типове</a:t>
+            </a:r>
+            <a:endParaRPr lang="en-US" dirty="0"/>
+          </a:p>
+        </p:txBody>
+      </p:sp>
+      <p:pic>
+        <p:nvPicPr>
+          <p:cNvPr id="4098" name="Picture 2" descr="http://www.kiwikidsnews.co.nz/games/wp-content/thumbs/custom/I/Integers_1_large.jpgv1296765317"/>
+          <p:cNvPicPr>
+            <a:picLocks noChangeAspect="1" noChangeArrowheads="1"/>
+          </p:cNvPicPr>
+          <p:nvPr/>
+        </p:nvPicPr>
+        <p:blipFill>
+          <a:blip r:embed="rId2">
+            <a:extLst>
+              <a:ext uri="{28A0092B-C50C-407E-A947-70E740481C1C}">
+                <a14:useLocalDpi xmlns:a14="http://schemas.microsoft.com/office/drawing/2010/main" val="0"/>
+              </a:ext>
+            </a:extLst>
+          </a:blip>
+          <a:srcRect/>
+          <a:stretch>
+            <a:fillRect/>
+          </a:stretch>
+        </p:blipFill>
+        <p:spPr bwMode="auto">
+          <a:xfrm>
+            <a:off x="3293075" y="2097088"/>
+            <a:ext cx="5602673" cy="4330401"/>
+          </a:xfrm>
+          <a:prstGeom prst="rect">
+            <a:avLst/>
+          </a:prstGeom>
+          <a:noFill/>
+          <a:extLst>
+            <a:ext uri="{909E8E84-426E-40DD-AFC4-6F175D3DCCD1}">
+              <a14:hiddenFill xmlns:a14="http://schemas.microsoft.com/office/drawing/2010/main">
+                <a:solidFill>
+                  <a:srgbClr val="FFFFFF"/>
+                </a:solidFill>
+              </a14:hiddenFill>
+            </a:ext>
+          </a:extLst>
+        </p:spPr>
+      </p:pic>
+    </p:spTree>
+    <p:extLst>
+      <p:ext uri="{BB962C8B-B14F-4D97-AF65-F5344CB8AC3E}">
+        <p14:creationId xmlns:p14="http://schemas.microsoft.com/office/powerpoint/2010/main" val="443352853"/>
+      </p:ext>
+    </p:extLst>
+  </p:cSld>
+  <p:clrMapOvr>
+    <a:masterClrMapping/>
+  </p:clrMapOvr>
+</p:sld>
+</file>
+
+<file path=ppt/slides/slide11.xml><?xml version="1.0" encoding="utf-8"?>
+<p:sld xmlns:a="http://schemas.openxmlformats.org/drawingml/2006/main" xmlns:r="http://schemas.openxmlformats.org/officeDocument/2006/relationships" xmlns:p="http://schemas.openxmlformats.org/presentationml/2006/main">
+  <p:cSld>
+    <p:spTree>
+      <p:nvGrpSpPr>
+        <p:cNvPr id="1" name=""/>
+        <p:cNvGrpSpPr/>
+        <p:nvPr/>
+      </p:nvGrpSpPr>
+      <p:grpSpPr>
+        <a:xfrm>
+          <a:off x="0" y="0"/>
+          <a:ext cx="0" cy="0"/>
+          <a:chOff x="0" y="0"/>
+          <a:chExt cx="0" cy="0"/>
+        </a:xfrm>
+      </p:grpSpPr>
+      <p:sp>
+        <p:nvSpPr>
+          <p:cNvPr id="2" name="Title 1"/>
+          <p:cNvSpPr>
+            <a:spLocks noGrp="1"/>
+          </p:cNvSpPr>
+          <p:nvPr>
+            <p:ph type="title"/>
+          </p:nvPr>
+        </p:nvSpPr>
+        <p:spPr/>
+        <p:txBody>
+          <a:bodyPr/>
+          <a:lstStyle/>
+          <a:p>
+            <a:pPr algn="ctr"/>
+            <a:r>
+              <a:rPr lang="bg-BG" dirty="0" smtClean="0"/>
+              <a:t>Аритметични оператори в </a:t>
+            </a:r>
+            <a:r>
+              <a:rPr lang="en-US" dirty="0" smtClean="0"/>
+              <a:t>JAVA</a:t>
+            </a:r>
+            <a:endParaRPr lang="en-US" dirty="0"/>
+          </a:p>
+        </p:txBody>
+      </p:sp>
+      <p:sp>
+        <p:nvSpPr>
+          <p:cNvPr id="3" name="Content Placeholder 2"/>
+          <p:cNvSpPr>
+            <a:spLocks noGrp="1"/>
+          </p:cNvSpPr>
+          <p:nvPr>
+            <p:ph idx="1"/>
+          </p:nvPr>
+        </p:nvSpPr>
+        <p:spPr/>
+        <p:txBody>
+          <a:bodyPr/>
+          <a:lstStyle/>
+          <a:p>
+            <a:r>
+              <a:rPr lang="bg-BG" dirty="0" smtClean="0"/>
+              <a:t>Аритметичните оператори представят математически операции</a:t>
+            </a:r>
+          </a:p>
+          <a:p>
+            <a:r>
+              <a:rPr lang="bg-BG" dirty="0" smtClean="0"/>
+              <a:t>Стандартни математически оператори +, -, *, /</a:t>
+            </a:r>
+          </a:p>
+          <a:p>
+            <a:r>
+              <a:rPr lang="bg-BG" dirty="0" smtClean="0"/>
+              <a:t>Модулен оператор за остатък от делене %</a:t>
+            </a:r>
+          </a:p>
+          <a:p>
+            <a:r>
+              <a:rPr lang="bg-BG" dirty="0" smtClean="0"/>
+              <a:t>Съкратен запис за </a:t>
+            </a:r>
+            <a:r>
+              <a:rPr lang="bg-BG" dirty="0" err="1" smtClean="0"/>
+              <a:t>инкреминиране</a:t>
+            </a:r>
+            <a:r>
+              <a:rPr lang="bg-BG" dirty="0" smtClean="0"/>
+              <a:t> с 1</a:t>
+            </a:r>
+            <a:r>
+              <a:rPr lang="en-US" dirty="0" smtClean="0"/>
+              <a:t>  ++</a:t>
+            </a:r>
+            <a:endParaRPr lang="bg-BG" dirty="0" smtClean="0"/>
+          </a:p>
+          <a:p>
+            <a:r>
+              <a:rPr lang="bg-BG" dirty="0" smtClean="0"/>
+              <a:t>Съкратен запис за </a:t>
+            </a:r>
+            <a:r>
+              <a:rPr lang="bg-BG" dirty="0" err="1" smtClean="0"/>
+              <a:t>декреминиране</a:t>
+            </a:r>
+            <a:r>
+              <a:rPr lang="bg-BG" dirty="0" smtClean="0"/>
+              <a:t> с 1</a:t>
+            </a:r>
+            <a:r>
+              <a:rPr lang="en-US" dirty="0" smtClean="0"/>
+              <a:t> --</a:t>
+            </a:r>
+            <a:endParaRPr lang="en-US" dirty="0"/>
+          </a:p>
+        </p:txBody>
+      </p:sp>
+    </p:spTree>
+    <p:extLst>
+      <p:ext uri="{BB962C8B-B14F-4D97-AF65-F5344CB8AC3E}">
+        <p14:creationId xmlns:p14="http://schemas.microsoft.com/office/powerpoint/2010/main" val="2749779214"/>
+      </p:ext>
+    </p:extLst>
+  </p:cSld>
+  <p:clrMapOvr>
+    <a:masterClrMapping/>
+  </p:clrMapOvr>
+</p:sld>
+</file>
+
+<file path=ppt/slides/slide12.xml><?xml version="1.0" encoding="utf-8"?>
+<p:sld xmlns:a="http://schemas.openxmlformats.org/drawingml/2006/main" xmlns:r="http://schemas.openxmlformats.org/officeDocument/2006/relationships" xmlns:p="http://schemas.openxmlformats.org/presentationml/2006/main">
+  <p:cSld>
+    <p:spTree>
+      <p:nvGrpSpPr>
+        <p:cNvPr id="1" name=""/>
+        <p:cNvGrpSpPr/>
+        <p:nvPr/>
+      </p:nvGrpSpPr>
+      <p:grpSpPr>
+        <a:xfrm>
+          <a:off x="0" y="0"/>
+          <a:ext cx="0" cy="0"/>
+          <a:chOff x="0" y="0"/>
+          <a:chExt cx="0" cy="0"/>
+        </a:xfrm>
+      </p:grpSpPr>
+      <p:sp>
+        <p:nvSpPr>
+          <p:cNvPr id="2" name="Title 1"/>
+          <p:cNvSpPr>
+            <a:spLocks noGrp="1"/>
+          </p:cNvSpPr>
+          <p:nvPr>
+            <p:ph type="title"/>
+          </p:nvPr>
+        </p:nvSpPr>
+        <p:spPr/>
+        <p:txBody>
+          <a:bodyPr/>
+          <a:lstStyle/>
+          <a:p>
+            <a:pPr algn="ctr"/>
+            <a:r>
+              <a:rPr lang="bg-BG" dirty="0"/>
+              <a:t>Аритметични оператори в </a:t>
+            </a:r>
+            <a:r>
+              <a:rPr lang="en-US" dirty="0" smtClean="0"/>
+              <a:t>JAVA </a:t>
+            </a:r>
+            <a:r>
+              <a:rPr lang="bg-BG" dirty="0" smtClean="0"/>
+              <a:t>ДЕМО</a:t>
+            </a:r>
+            <a:endParaRPr lang="en-US" dirty="0"/>
+          </a:p>
+        </p:txBody>
+      </p:sp>
+      <p:pic>
+        <p:nvPicPr>
+          <p:cNvPr id="5122" name="Picture 2" descr="http://upload.wikimedia.org/wikipedia/commons/5/59/PlusMinusTimesDivide.png"/>
+          <p:cNvPicPr>
+            <a:picLocks noChangeAspect="1" noChangeArrowheads="1"/>
+          </p:cNvPicPr>
+          <p:nvPr/>
+        </p:nvPicPr>
+        <p:blipFill>
+          <a:blip r:embed="rId2">
+            <a:extLst>
+              <a:ext uri="{28A0092B-C50C-407E-A947-70E740481C1C}">
+                <a14:useLocalDpi xmlns:a14="http://schemas.microsoft.com/office/drawing/2010/main" val="0"/>
+              </a:ext>
+            </a:extLst>
+          </a:blip>
+          <a:srcRect/>
+          <a:stretch>
+            <a:fillRect/>
+          </a:stretch>
+        </p:blipFill>
+        <p:spPr bwMode="auto">
+          <a:xfrm>
+            <a:off x="4009702" y="2097088"/>
+            <a:ext cx="4169419" cy="4169421"/>
+          </a:xfrm>
+          <a:prstGeom prst="rect">
+            <a:avLst/>
+          </a:prstGeom>
+          <a:noFill/>
+          <a:extLst>
+            <a:ext uri="{909E8E84-426E-40DD-AFC4-6F175D3DCCD1}">
+              <a14:hiddenFill xmlns:a14="http://schemas.microsoft.com/office/drawing/2010/main">
+                <a:solidFill>
+                  <a:srgbClr val="FFFFFF"/>
+                </a:solidFill>
+              </a14:hiddenFill>
+            </a:ext>
+          </a:extLst>
+        </p:spPr>
+      </p:pic>
+    </p:spTree>
+    <p:extLst>
+      <p:ext uri="{BB962C8B-B14F-4D97-AF65-F5344CB8AC3E}">
+        <p14:creationId xmlns:p14="http://schemas.microsoft.com/office/powerpoint/2010/main" val="628813397"/>
+      </p:ext>
+    </p:extLst>
+  </p:cSld>
+  <p:clrMapOvr>
+    <a:masterClrMapping/>
+  </p:clrMapOvr>
+</p:sld>
+</file>
+
+<file path=ppt/slides/slide13.xml><?xml version="1.0" encoding="utf-8"?>
+<p:sld xmlns:a="http://schemas.openxmlformats.org/drawingml/2006/main" xmlns:r="http://schemas.openxmlformats.org/officeDocument/2006/relationships" xmlns:p="http://schemas.openxmlformats.org/presentationml/2006/main">
+  <p:cSld>
+    <p:spTree>
+      <p:nvGrpSpPr>
+        <p:cNvPr id="1" name=""/>
+        <p:cNvGrpSpPr/>
+        <p:nvPr/>
+      </p:nvGrpSpPr>
+      <p:grpSpPr>
+        <a:xfrm>
+          <a:off x="0" y="0"/>
+          <a:ext cx="0" cy="0"/>
+          <a:chOff x="0" y="0"/>
+          <a:chExt cx="0" cy="0"/>
+        </a:xfrm>
+      </p:grpSpPr>
+      <p:sp>
+        <p:nvSpPr>
+          <p:cNvPr id="2" name="Title 1"/>
+          <p:cNvSpPr>
+            <a:spLocks noGrp="1"/>
+          </p:cNvSpPr>
+          <p:nvPr>
+            <p:ph type="title"/>
+          </p:nvPr>
+        </p:nvSpPr>
+        <p:spPr/>
+        <p:txBody>
+          <a:bodyPr/>
+          <a:lstStyle/>
+          <a:p>
+            <a:pPr algn="ctr"/>
+            <a:r>
+              <a:rPr lang="bg-BG" dirty="0" smtClean="0"/>
+              <a:t>сравняване в </a:t>
+            </a:r>
+            <a:r>
+              <a:rPr lang="en-US" dirty="0" smtClean="0"/>
+              <a:t>JAVA</a:t>
+            </a:r>
+            <a:endParaRPr lang="en-US" dirty="0"/>
+          </a:p>
+        </p:txBody>
+      </p:sp>
+      <p:sp>
+        <p:nvSpPr>
+          <p:cNvPr id="3" name="Content Placeholder 2"/>
+          <p:cNvSpPr>
+            <a:spLocks noGrp="1"/>
+          </p:cNvSpPr>
+          <p:nvPr>
+            <p:ph idx="1"/>
+          </p:nvPr>
+        </p:nvSpPr>
+        <p:spPr/>
+        <p:txBody>
+          <a:bodyPr/>
+          <a:lstStyle/>
+          <a:p>
+            <a:r>
+              <a:rPr lang="bg-BG" dirty="0" smtClean="0"/>
+              <a:t>Сравняването в </a:t>
+            </a:r>
+            <a:r>
+              <a:rPr lang="en-US" dirty="0" smtClean="0"/>
+              <a:t>JAVA </a:t>
+            </a:r>
+            <a:r>
+              <a:rPr lang="bg-BG" dirty="0" smtClean="0"/>
+              <a:t>се извършва с операторите за сравнение</a:t>
+            </a:r>
+          </a:p>
+          <a:p>
+            <a:r>
+              <a:rPr lang="bg-BG" dirty="0" smtClean="0"/>
+              <a:t>==,!=, &lt;, &gt;, &lt;=, &gt;=</a:t>
+            </a:r>
+          </a:p>
+          <a:p>
+            <a:r>
+              <a:rPr lang="bg-BG" dirty="0" smtClean="0"/>
+              <a:t>Резултатът от сравняване винаги е </a:t>
+            </a:r>
+            <a:r>
+              <a:rPr lang="en-US" dirty="0" smtClean="0"/>
+              <a:t>Boolean</a:t>
+            </a:r>
+            <a:endParaRPr lang="bg-BG" dirty="0" smtClean="0"/>
+          </a:p>
+          <a:p>
+            <a:endParaRPr lang="en-US" dirty="0"/>
+          </a:p>
+        </p:txBody>
+      </p:sp>
+    </p:spTree>
+    <p:extLst>
+      <p:ext uri="{BB962C8B-B14F-4D97-AF65-F5344CB8AC3E}">
+        <p14:creationId xmlns:p14="http://schemas.microsoft.com/office/powerpoint/2010/main" val="1909427029"/>
+      </p:ext>
+    </p:extLst>
+  </p:cSld>
+  <p:clrMapOvr>
+    <a:masterClrMapping/>
+  </p:clrMapOvr>
+</p:sld>
+</file>
+
+<file path=ppt/slides/slide14.xml><?xml version="1.0" encoding="utf-8"?>
+<p:sld xmlns:a="http://schemas.openxmlformats.org/drawingml/2006/main" xmlns:r="http://schemas.openxmlformats.org/officeDocument/2006/relationships" xmlns:p="http://schemas.openxmlformats.org/presentationml/2006/main">
+  <p:cSld>
+    <p:spTree>
+      <p:nvGrpSpPr>
+        <p:cNvPr id="1" name=""/>
+        <p:cNvGrpSpPr/>
+        <p:nvPr/>
+      </p:nvGrpSpPr>
+      <p:grpSpPr>
+        <a:xfrm>
+          <a:off x="0" y="0"/>
+          <a:ext cx="0" cy="0"/>
+          <a:chOff x="0" y="0"/>
+          <a:chExt cx="0" cy="0"/>
+        </a:xfrm>
+      </p:grpSpPr>
+      <p:sp>
+        <p:nvSpPr>
+          <p:cNvPr id="2" name="Title 1"/>
+          <p:cNvSpPr>
+            <a:spLocks noGrp="1"/>
+          </p:cNvSpPr>
+          <p:nvPr>
+            <p:ph type="title"/>
+          </p:nvPr>
+        </p:nvSpPr>
+        <p:spPr/>
+        <p:txBody>
+          <a:bodyPr/>
+          <a:lstStyle/>
+          <a:p>
+            <a:pPr algn="ctr"/>
+            <a:r>
+              <a:rPr lang="bg-BG" dirty="0"/>
+              <a:t>сравняване в </a:t>
+            </a:r>
+            <a:r>
+              <a:rPr lang="en-US" dirty="0" smtClean="0"/>
+              <a:t>JAVA</a:t>
+            </a:r>
+            <a:r>
+              <a:rPr lang="bg-BG" dirty="0" smtClean="0"/>
+              <a:t> демо</a:t>
+            </a:r>
+            <a:endParaRPr lang="en-US" dirty="0"/>
+          </a:p>
+        </p:txBody>
+      </p:sp>
+      <p:pic>
+        <p:nvPicPr>
+          <p:cNvPr id="6146" name="Picture 2" descr="http://img.c4learn.com/2012/03/Boolean-data-type-in-java-programming.jpg"/>
+          <p:cNvPicPr>
+            <a:picLocks noChangeAspect="1" noChangeArrowheads="1"/>
+          </p:cNvPicPr>
+          <p:nvPr/>
+        </p:nvPicPr>
+        <p:blipFill>
+          <a:blip r:embed="rId2">
+            <a:extLst>
+              <a:ext uri="{28A0092B-C50C-407E-A947-70E740481C1C}">
+                <a14:useLocalDpi xmlns:a14="http://schemas.microsoft.com/office/drawing/2010/main" val="0"/>
+              </a:ext>
+            </a:extLst>
+          </a:blip>
+          <a:srcRect/>
+          <a:stretch>
+            <a:fillRect/>
+          </a:stretch>
+        </p:blipFill>
+        <p:spPr bwMode="auto">
+          <a:xfrm>
+            <a:off x="3142798" y="2097088"/>
+            <a:ext cx="5903227" cy="4434764"/>
+          </a:xfrm>
+          <a:prstGeom prst="rect">
+            <a:avLst/>
+          </a:prstGeom>
+          <a:noFill/>
+          <a:extLst>
+            <a:ext uri="{909E8E84-426E-40DD-AFC4-6F175D3DCCD1}">
+              <a14:hiddenFill xmlns:a14="http://schemas.microsoft.com/office/drawing/2010/main">
+                <a:solidFill>
+                  <a:srgbClr val="FFFFFF"/>
+                </a:solidFill>
+              </a14:hiddenFill>
+            </a:ext>
+          </a:extLst>
+        </p:spPr>
+      </p:pic>
+    </p:spTree>
+    <p:extLst>
+      <p:ext uri="{BB962C8B-B14F-4D97-AF65-F5344CB8AC3E}">
+        <p14:creationId xmlns:p14="http://schemas.microsoft.com/office/powerpoint/2010/main" val="2696818145"/>
+      </p:ext>
+    </p:extLst>
+  </p:cSld>
+  <p:clrMapOvr>
+    <a:masterClrMapping/>
+  </p:clrMapOvr>
+</p:sld>
+</file>
+
+<file path=ppt/slides/slide15.xml><?xml version="1.0" encoding="utf-8"?>
+<p:sld xmlns:a="http://schemas.openxmlformats.org/drawingml/2006/main" xmlns:r="http://schemas.openxmlformats.org/officeDocument/2006/relationships" xmlns:p="http://schemas.openxmlformats.org/presentationml/2006/main">
+  <p:cSld>
+    <p:spTree>
+      <p:nvGrpSpPr>
+        <p:cNvPr id="1" name=""/>
+        <p:cNvGrpSpPr/>
+        <p:nvPr/>
+      </p:nvGrpSpPr>
+      <p:grpSpPr>
+        <a:xfrm>
+          <a:off x="0" y="0"/>
+          <a:ext cx="0" cy="0"/>
+          <a:chOff x="0" y="0"/>
+          <a:chExt cx="0" cy="0"/>
+        </a:xfrm>
+      </p:grpSpPr>
+      <p:sp>
+        <p:nvSpPr>
+          <p:cNvPr id="2" name="Title 1"/>
+          <p:cNvSpPr>
+            <a:spLocks noGrp="1"/>
+          </p:cNvSpPr>
+          <p:nvPr>
+            <p:ph type="title"/>
+          </p:nvPr>
+        </p:nvSpPr>
+        <p:spPr/>
+        <p:txBody>
+          <a:bodyPr/>
+          <a:lstStyle/>
+          <a:p>
+            <a:pPr algn="ctr"/>
+            <a:r>
+              <a:rPr lang="bg-BG" dirty="0" smtClean="0"/>
+              <a:t>Логически оператори </a:t>
+            </a:r>
+            <a:r>
+              <a:rPr lang="en-US" dirty="0" smtClean="0"/>
+              <a:t>JAVA</a:t>
+            </a:r>
+            <a:endParaRPr lang="en-US" dirty="0"/>
+          </a:p>
+        </p:txBody>
+      </p:sp>
+      <p:sp>
+        <p:nvSpPr>
+          <p:cNvPr id="3" name="Content Placeholder 2"/>
+          <p:cNvSpPr>
+            <a:spLocks noGrp="1"/>
+          </p:cNvSpPr>
+          <p:nvPr>
+            <p:ph idx="1"/>
+          </p:nvPr>
+        </p:nvSpPr>
+        <p:spPr/>
+        <p:txBody>
+          <a:bodyPr>
+            <a:normAutofit fontScale="92500" lnSpcReduction="10000"/>
+          </a:bodyPr>
+          <a:lstStyle/>
+          <a:p>
+            <a:r>
+              <a:rPr lang="bg-BG" dirty="0" smtClean="0"/>
+              <a:t>Извършват се върху </a:t>
+            </a:r>
+            <a:r>
+              <a:rPr lang="en-US" dirty="0" smtClean="0"/>
+              <a:t>Boolean </a:t>
+            </a:r>
+            <a:r>
+              <a:rPr lang="bg-BG" dirty="0" smtClean="0"/>
+              <a:t>променливи или изрази за сравняване (защото те връщат </a:t>
+            </a:r>
+            <a:r>
+              <a:rPr lang="en-US" dirty="0" err="1" smtClean="0"/>
+              <a:t>boolean</a:t>
+            </a:r>
+            <a:r>
+              <a:rPr lang="bg-BG" dirty="0" smtClean="0"/>
+              <a:t>)</a:t>
+            </a:r>
+            <a:endParaRPr lang="en-US" dirty="0"/>
+          </a:p>
+          <a:p>
+            <a:r>
+              <a:rPr lang="en-US" dirty="0" smtClean="0"/>
+              <a:t>&amp;&amp; </a:t>
+            </a:r>
+            <a:r>
+              <a:rPr lang="bg-BG" dirty="0" smtClean="0"/>
+              <a:t>- Логическо И</a:t>
+            </a:r>
+          </a:p>
+          <a:p>
+            <a:r>
+              <a:rPr lang="en-US" dirty="0" smtClean="0"/>
+              <a:t>|| </a:t>
+            </a:r>
+            <a:r>
+              <a:rPr lang="bg-BG" dirty="0" smtClean="0"/>
+              <a:t>- Логическо ИЛИ</a:t>
+            </a:r>
+          </a:p>
+          <a:p>
+            <a:r>
+              <a:rPr lang="en-US" dirty="0" smtClean="0"/>
+              <a:t>^ - XOR</a:t>
+            </a:r>
+            <a:r>
+              <a:rPr lang="bg-BG" dirty="0" smtClean="0"/>
+              <a:t> </a:t>
+            </a:r>
+            <a:endParaRPr lang="en-US" dirty="0" smtClean="0"/>
+          </a:p>
+          <a:p>
+            <a:r>
+              <a:rPr lang="bg-BG" dirty="0" smtClean="0"/>
+              <a:t>! – оператор за отрицание</a:t>
+            </a:r>
+          </a:p>
+          <a:p>
+            <a:r>
+              <a:rPr lang="bg-BG" dirty="0" smtClean="0"/>
+              <a:t>Приоритет на операторите</a:t>
+            </a:r>
+            <a:r>
+              <a:rPr lang="en-US" dirty="0" smtClean="0"/>
+              <a:t> !, ^, &amp;&amp;, ||</a:t>
+            </a:r>
+            <a:endParaRPr lang="en-US" dirty="0"/>
+          </a:p>
+        </p:txBody>
+      </p:sp>
+    </p:spTree>
+    <p:extLst>
+      <p:ext uri="{BB962C8B-B14F-4D97-AF65-F5344CB8AC3E}">
+        <p14:creationId xmlns:p14="http://schemas.microsoft.com/office/powerpoint/2010/main" val="2440621826"/>
+      </p:ext>
+    </p:extLst>
+  </p:cSld>
+  <p:clrMapOvr>
+    <a:masterClrMapping/>
+  </p:clrMapOvr>
+</p:sld>
+</file>
+
+<file path=ppt/slides/slide16.xml><?xml version="1.0" encoding="utf-8"?>
+<p:sld xmlns:a="http://schemas.openxmlformats.org/drawingml/2006/main" xmlns:r="http://schemas.openxmlformats.org/officeDocument/2006/relationships" xmlns:p="http://schemas.openxmlformats.org/presentationml/2006/main">
+  <p:cSld>
+    <p:spTree>
+      <p:nvGrpSpPr>
+        <p:cNvPr id="1" name=""/>
+        <p:cNvGrpSpPr/>
+        <p:nvPr/>
+      </p:nvGrpSpPr>
+      <p:grpSpPr>
+        <a:xfrm>
+          <a:off x="0" y="0"/>
+          <a:ext cx="0" cy="0"/>
+          <a:chOff x="0" y="0"/>
+          <a:chExt cx="0" cy="0"/>
+        </a:xfrm>
+      </p:grpSpPr>
+      <p:sp>
+        <p:nvSpPr>
+          <p:cNvPr id="2" name="Title 1"/>
+          <p:cNvSpPr>
+            <a:spLocks noGrp="1"/>
+          </p:cNvSpPr>
+          <p:nvPr>
+            <p:ph type="title"/>
+          </p:nvPr>
+        </p:nvSpPr>
+        <p:spPr/>
+        <p:txBody>
+          <a:bodyPr/>
+          <a:lstStyle/>
+          <a:p>
+            <a:pPr algn="ctr"/>
+            <a:r>
+              <a:rPr lang="bg-BG" dirty="0" smtClean="0"/>
+              <a:t>Логически оператори ДЕМО</a:t>
+            </a:r>
+            <a:endParaRPr lang="en-US" dirty="0"/>
+          </a:p>
+        </p:txBody>
+      </p:sp>
+      <p:pic>
+        <p:nvPicPr>
+          <p:cNvPr id="7170" name="Picture 2" descr="http://www.java-samples.com/images/java.h4.gif"/>
+          <p:cNvPicPr>
+            <a:picLocks noChangeAspect="1" noChangeArrowheads="1"/>
+          </p:cNvPicPr>
+          <p:nvPr/>
+        </p:nvPicPr>
+        <p:blipFill>
+          <a:blip r:embed="rId2">
+            <a:extLst>
+              <a:ext uri="{28A0092B-C50C-407E-A947-70E740481C1C}">
+                <a14:useLocalDpi xmlns:a14="http://schemas.microsoft.com/office/drawing/2010/main" val="0"/>
+              </a:ext>
+            </a:extLst>
+          </a:blip>
+          <a:srcRect/>
+          <a:stretch>
+            <a:fillRect/>
+          </a:stretch>
+        </p:blipFill>
+        <p:spPr bwMode="auto">
+          <a:xfrm>
+            <a:off x="1287161" y="2097088"/>
+            <a:ext cx="9614501" cy="3867287"/>
+          </a:xfrm>
+          <a:prstGeom prst="rect">
+            <a:avLst/>
+          </a:prstGeom>
+          <a:noFill/>
+          <a:extLst>
+            <a:ext uri="{909E8E84-426E-40DD-AFC4-6F175D3DCCD1}">
+              <a14:hiddenFill xmlns:a14="http://schemas.microsoft.com/office/drawing/2010/main">
+                <a:solidFill>
+                  <a:srgbClr val="FFFFFF"/>
+                </a:solidFill>
+              </a14:hiddenFill>
+            </a:ext>
+          </a:extLst>
+        </p:spPr>
+      </p:pic>
+    </p:spTree>
+    <p:extLst>
+      <p:ext uri="{BB962C8B-B14F-4D97-AF65-F5344CB8AC3E}">
+        <p14:creationId xmlns:p14="http://schemas.microsoft.com/office/powerpoint/2010/main" val="373513556"/>
+      </p:ext>
+    </p:extLst>
+  </p:cSld>
+  <p:clrMapOvr>
+    <a:masterClrMapping/>
+  </p:clrMapOvr>
+</p:sld>
+</file>
+
+<file path=ppt/slides/slide17.xml><?xml version="1.0" encoding="utf-8"?>
+<p:sld xmlns:a="http://schemas.openxmlformats.org/drawingml/2006/main" xmlns:r="http://schemas.openxmlformats.org/officeDocument/2006/relationships" xmlns:p="http://schemas.openxmlformats.org/presentationml/2006/main">
+  <p:cSld>
+    <p:spTree>
+      <p:nvGrpSpPr>
+        <p:cNvPr id="1" name=""/>
+        <p:cNvGrpSpPr/>
+        <p:nvPr/>
+      </p:nvGrpSpPr>
+      <p:grpSpPr>
+        <a:xfrm>
+          <a:off x="0" y="0"/>
+          <a:ext cx="0" cy="0"/>
+          <a:chOff x="0" y="0"/>
+          <a:chExt cx="0" cy="0"/>
+        </a:xfrm>
+      </p:grpSpPr>
+      <p:sp>
+        <p:nvSpPr>
+          <p:cNvPr id="2" name="Title 1"/>
+          <p:cNvSpPr>
+            <a:spLocks noGrp="1"/>
+          </p:cNvSpPr>
+          <p:nvPr>
+            <p:ph type="title"/>
+          </p:nvPr>
+        </p:nvSpPr>
+        <p:spPr/>
+        <p:txBody>
+          <a:bodyPr/>
+          <a:lstStyle/>
+          <a:p>
+            <a:r>
+              <a:rPr lang="bg-BG" dirty="0" smtClean="0"/>
+              <a:t>	Четене и писане в конзолата</a:t>
+            </a:r>
+            <a:endParaRPr lang="en-US" dirty="0"/>
+          </a:p>
+        </p:txBody>
+      </p:sp>
+      <p:sp>
+        <p:nvSpPr>
+          <p:cNvPr id="3" name="Content Placeholder 2"/>
+          <p:cNvSpPr>
+            <a:spLocks noGrp="1"/>
+          </p:cNvSpPr>
+          <p:nvPr>
+            <p:ph idx="1"/>
+          </p:nvPr>
+        </p:nvSpPr>
+        <p:spPr/>
+        <p:txBody>
+          <a:bodyPr/>
+          <a:lstStyle/>
+          <a:p>
+            <a:r>
+              <a:rPr lang="bg-BG" dirty="0" smtClean="0"/>
+              <a:t>Писането на конзолата се осъществява с помощта на</a:t>
+            </a:r>
+            <a:r>
+              <a:rPr lang="en-US" dirty="0" smtClean="0"/>
+              <a:t> </a:t>
+            </a:r>
+            <a:r>
+              <a:rPr lang="bg-BG" dirty="0" smtClean="0"/>
+              <a:t>функциите </a:t>
+            </a:r>
+            <a:r>
+              <a:rPr lang="en-US" dirty="0" err="1"/>
+              <a:t>System.out.print</a:t>
+            </a:r>
+            <a:r>
+              <a:rPr lang="en-US" dirty="0"/>
+              <a:t>() </a:t>
+            </a:r>
+            <a:r>
+              <a:rPr lang="bg-BG" dirty="0"/>
+              <a:t>и</a:t>
+            </a:r>
+            <a:r>
+              <a:rPr lang="bg-BG" dirty="0" smtClean="0"/>
+              <a:t> </a:t>
+            </a:r>
+            <a:r>
+              <a:rPr lang="en-US" dirty="0" err="1"/>
+              <a:t>System.out.println</a:t>
+            </a:r>
+            <a:r>
+              <a:rPr lang="en-US" dirty="0"/>
+              <a:t>();</a:t>
+            </a:r>
+            <a:endParaRPr lang="bg-BG" dirty="0"/>
+          </a:p>
+          <a:p>
+            <a:r>
+              <a:rPr lang="bg-BG" dirty="0" smtClean="0"/>
+              <a:t>Ченето от конзолата се осъществява с помощта на класа </a:t>
+            </a:r>
+            <a:r>
+              <a:rPr lang="en-US" dirty="0" smtClean="0"/>
+              <a:t>Scanner</a:t>
+            </a:r>
+            <a:endParaRPr lang="bg-BG" dirty="0" smtClean="0"/>
+          </a:p>
+          <a:p>
+            <a:r>
+              <a:rPr lang="bg-BG" dirty="0" smtClean="0"/>
+              <a:t>Ако </a:t>
+            </a:r>
+            <a:r>
+              <a:rPr lang="en-US" dirty="0" smtClean="0"/>
+              <a:t>Scanner </a:t>
+            </a:r>
+            <a:r>
+              <a:rPr lang="bg-BG" dirty="0" smtClean="0"/>
+              <a:t>получи стойност различна от очакваната се генерира грешка</a:t>
+            </a:r>
+            <a:endParaRPr lang="en-US" dirty="0" smtClean="0"/>
+          </a:p>
+          <a:p>
+            <a:pPr marL="0" indent="0">
+              <a:buNone/>
+            </a:pPr>
+            <a:endParaRPr lang="bg-BG" dirty="0"/>
+          </a:p>
+          <a:p>
+            <a:pPr marL="0" indent="0">
+              <a:buNone/>
+            </a:pPr>
+            <a:endParaRPr lang="en-US" dirty="0"/>
+          </a:p>
+        </p:txBody>
+      </p:sp>
+    </p:spTree>
+    <p:extLst>
+      <p:ext uri="{BB962C8B-B14F-4D97-AF65-F5344CB8AC3E}">
+        <p14:creationId xmlns:p14="http://schemas.microsoft.com/office/powerpoint/2010/main" val="2831436200"/>
+      </p:ext>
+    </p:extLst>
+  </p:cSld>
+  <p:clrMapOvr>
+    <a:masterClrMapping/>
+  </p:clrMapOvr>
+</p:sld>
+</file>
+
+<file path=ppt/slides/slide18.xml><?xml version="1.0" encoding="utf-8"?>
+<p:sld xmlns:a="http://schemas.openxmlformats.org/drawingml/2006/main" xmlns:r="http://schemas.openxmlformats.org/officeDocument/2006/relationships" xmlns:p="http://schemas.openxmlformats.org/presentationml/2006/main">
+  <p:cSld>
+    <p:spTree>
+      <p:nvGrpSpPr>
+        <p:cNvPr id="1" name=""/>
+        <p:cNvGrpSpPr/>
+        <p:nvPr/>
+      </p:nvGrpSpPr>
+      <p:grpSpPr>
+        <a:xfrm>
+          <a:off x="0" y="0"/>
+          <a:ext cx="0" cy="0"/>
+          <a:chOff x="0" y="0"/>
+          <a:chExt cx="0" cy="0"/>
+        </a:xfrm>
+      </p:grpSpPr>
+      <p:sp>
+        <p:nvSpPr>
+          <p:cNvPr id="2" name="Title 1"/>
+          <p:cNvSpPr>
+            <a:spLocks noGrp="1"/>
+          </p:cNvSpPr>
+          <p:nvPr>
+            <p:ph type="title"/>
+          </p:nvPr>
+        </p:nvSpPr>
+        <p:spPr/>
+        <p:txBody>
+          <a:bodyPr/>
+          <a:lstStyle/>
+          <a:p>
+            <a:r>
+              <a:rPr lang="bg-BG" dirty="0"/>
+              <a:t>	Четене и писане в </a:t>
+            </a:r>
+            <a:r>
+              <a:rPr lang="bg-BG" dirty="0" smtClean="0"/>
+              <a:t>конзолата </a:t>
+            </a:r>
+            <a:r>
+              <a:rPr lang="bg-BG" dirty="0" err="1" smtClean="0"/>
+              <a:t>ДЕмо</a:t>
+            </a:r>
+            <a:endParaRPr lang="en-US" dirty="0"/>
+          </a:p>
+        </p:txBody>
+      </p:sp>
+      <p:pic>
+        <p:nvPicPr>
+          <p:cNvPr id="9218" name="Picture 2" descr="http://kalimfleet.net/media/img/console.png"/>
+          <p:cNvPicPr>
+            <a:picLocks noChangeAspect="1" noChangeArrowheads="1"/>
+          </p:cNvPicPr>
+          <p:nvPr/>
+        </p:nvPicPr>
+        <p:blipFill>
+          <a:blip r:embed="rId2">
+            <a:extLst>
+              <a:ext uri="{28A0092B-C50C-407E-A947-70E740481C1C}">
+                <a14:useLocalDpi xmlns:a14="http://schemas.microsoft.com/office/drawing/2010/main" val="0"/>
+              </a:ext>
+            </a:extLst>
+          </a:blip>
+          <a:srcRect/>
+          <a:stretch>
+            <a:fillRect/>
+          </a:stretch>
+        </p:blipFill>
+        <p:spPr bwMode="auto">
+          <a:xfrm>
+            <a:off x="2064371" y="2097088"/>
+            <a:ext cx="8060082" cy="4402566"/>
+          </a:xfrm>
+          <a:prstGeom prst="rect">
+            <a:avLst/>
+          </a:prstGeom>
+          <a:noFill/>
+          <a:extLst>
+            <a:ext uri="{909E8E84-426E-40DD-AFC4-6F175D3DCCD1}">
+              <a14:hiddenFill xmlns:a14="http://schemas.microsoft.com/office/drawing/2010/main">
+                <a:solidFill>
+                  <a:srgbClr val="FFFFFF"/>
+                </a:solidFill>
+              </a14:hiddenFill>
+            </a:ext>
+          </a:extLst>
+        </p:spPr>
+      </p:pic>
+    </p:spTree>
+    <p:extLst>
+      <p:ext uri="{BB962C8B-B14F-4D97-AF65-F5344CB8AC3E}">
+        <p14:creationId xmlns:p14="http://schemas.microsoft.com/office/powerpoint/2010/main" val="443733170"/>
+      </p:ext>
+    </p:extLst>
+  </p:cSld>
+  <p:clrMapOvr>
+    <a:masterClrMapping/>
+  </p:clrMapOvr>
+</p:sld>
+</file>
+
+<file path=ppt/slides/slide19.xml><?xml version="1.0" encoding="utf-8"?>
+<p:sld xmlns:a="http://schemas.openxmlformats.org/drawingml/2006/main" xmlns:r="http://schemas.openxmlformats.org/officeDocument/2006/relationships" xmlns:p="http://schemas.openxmlformats.org/presentationml/2006/main">
+  <p:cSld>
+    <p:spTree>
+      <p:nvGrpSpPr>
+        <p:cNvPr id="1" name=""/>
+        <p:cNvGrpSpPr/>
+        <p:nvPr/>
+      </p:nvGrpSpPr>
+      <p:grpSpPr>
+        <a:xfrm>
+          <a:off x="0" y="0"/>
+          <a:ext cx="0" cy="0"/>
+          <a:chOff x="0" y="0"/>
+          <a:chExt cx="0" cy="0"/>
+        </a:xfrm>
+      </p:grpSpPr>
+      <p:sp>
+        <p:nvSpPr>
+          <p:cNvPr id="2" name="Title 1"/>
+          <p:cNvSpPr>
+            <a:spLocks noGrp="1"/>
+          </p:cNvSpPr>
+          <p:nvPr>
+            <p:ph type="title"/>
+          </p:nvPr>
+        </p:nvSpPr>
+        <p:spPr/>
+        <p:txBody>
+          <a:bodyPr/>
+          <a:lstStyle/>
+          <a:p>
+            <a:pPr algn="ctr"/>
+            <a:r>
+              <a:rPr lang="bg-BG" dirty="0" smtClean="0"/>
+              <a:t>задача</a:t>
+            </a:r>
+            <a:endParaRPr lang="en-US" dirty="0"/>
+          </a:p>
+        </p:txBody>
+      </p:sp>
+      <p:sp>
+        <p:nvSpPr>
+          <p:cNvPr id="3" name="Content Placeholder 2"/>
+          <p:cNvSpPr>
+            <a:spLocks noGrp="1"/>
+          </p:cNvSpPr>
+          <p:nvPr>
+            <p:ph idx="1"/>
+          </p:nvPr>
+        </p:nvSpPr>
+        <p:spPr/>
+        <p:txBody>
+          <a:bodyPr>
+            <a:normAutofit fontScale="92500" lnSpcReduction="20000"/>
+          </a:bodyPr>
+          <a:lstStyle/>
+          <a:p>
+            <a:r>
+              <a:rPr lang="bg-BG" dirty="0" smtClean="0"/>
+              <a:t>Направете програма, която чете от конзолата 1 </a:t>
+            </a:r>
+            <a:r>
+              <a:rPr lang="en-US" dirty="0" smtClean="0"/>
+              <a:t>string</a:t>
+            </a:r>
+            <a:r>
+              <a:rPr lang="bg-BG" dirty="0" smtClean="0"/>
+              <a:t> и 2 целочислени числа. Проверете и изкарайте на конзолата</a:t>
+            </a:r>
+          </a:p>
+          <a:p>
+            <a:pPr marL="457200" indent="-457200">
+              <a:buAutoNum type="arabicParenR"/>
+            </a:pPr>
+            <a:r>
+              <a:rPr lang="bg-BG" dirty="0" smtClean="0"/>
+              <a:t>Дали размера на </a:t>
+            </a:r>
+            <a:r>
+              <a:rPr lang="en-US" dirty="0" smtClean="0"/>
+              <a:t>string </a:t>
+            </a:r>
+            <a:r>
+              <a:rPr lang="bg-BG" dirty="0" smtClean="0"/>
+              <a:t>е по-голям от 10</a:t>
+            </a:r>
+          </a:p>
+          <a:p>
+            <a:pPr marL="457200" indent="-457200">
+              <a:buAutoNum type="arabicParenR"/>
+            </a:pPr>
+            <a:r>
+              <a:rPr lang="bg-BG" dirty="0" smtClean="0"/>
+              <a:t>Дали първото число е по-голямо от второто</a:t>
+            </a:r>
+          </a:p>
+          <a:p>
+            <a:pPr marL="457200" indent="-457200">
+              <a:buAutoNum type="arabicParenR"/>
+            </a:pPr>
+            <a:r>
+              <a:rPr lang="bg-BG" dirty="0" smtClean="0"/>
+              <a:t>Дали второто число е в интервала </a:t>
+            </a:r>
+            <a:r>
+              <a:rPr lang="en-US" dirty="0" smtClean="0"/>
+              <a:t>[-100; 15)</a:t>
+            </a:r>
+          </a:p>
+          <a:p>
+            <a:pPr marL="457200" indent="-457200">
+              <a:buAutoNum type="arabicParenR"/>
+            </a:pPr>
+            <a:r>
+              <a:rPr lang="bg-BG" dirty="0" smtClean="0"/>
+              <a:t>Остатъкът от деленето на първото число с второто</a:t>
+            </a:r>
+          </a:p>
+          <a:p>
+            <a:pPr marL="457200" indent="-457200">
+              <a:buAutoNum type="arabicParenR"/>
+            </a:pPr>
+            <a:r>
+              <a:rPr lang="bg-BG" dirty="0" smtClean="0"/>
+              <a:t>Резултатът от логическата операция – Дали първото число е по-голямо от 10 или второто число е по-малко от 88</a:t>
+            </a:r>
+            <a:endParaRPr lang="en-US" dirty="0"/>
+          </a:p>
+        </p:txBody>
+      </p:sp>
+    </p:spTree>
+    <p:extLst>
+      <p:ext uri="{BB962C8B-B14F-4D97-AF65-F5344CB8AC3E}">
+        <p14:creationId xmlns:p14="http://schemas.microsoft.com/office/powerpoint/2010/main" val="1085011104"/>
+      </p:ext>
+    </p:extLst>
+  </p:cSld>
+  <p:clrMapOvr>
+    <a:masterClrMapping/>
+  </p:clrMapOvr>
+</p:sld>
+</file>
+
 <file path=ppt/slides/slide2.xml><?xml version="1.0" encoding="utf-8"?>
 <p:sld xmlns:a="http://schemas.openxmlformats.org/drawingml/2006/main" xmlns:r="http://schemas.openxmlformats.org/officeDocument/2006/relationships" xmlns:p="http://schemas.openxmlformats.org/presentationml/2006/main">
   <p:cSld>
@@ -12553,14 +13759,46 @@
           <a:p>
             <a:r>
               <a:rPr lang="bg-BG" dirty="0" smtClean="0"/>
-              <a:t>Информацията която се намира в паметта на компютъра се съхранява в променливи</a:t>
-            </a:r>
-          </a:p>
-          <a:p>
+              <a:t>Информацията която се намира в паметта на компютъра се съхранява в </a:t>
+            </a:r>
             <a:r>
               <a:rPr lang="bg-BG" dirty="0" smtClean="0"/>
-              <a:t>Променливите имат  име, тип и стойност</a:t>
-            </a:r>
+              <a:t>променливи</a:t>
+            </a:r>
+            <a:endParaRPr lang="bg-BG" dirty="0" smtClean="0"/>
+          </a:p>
+          <a:p>
+            <a:r>
+              <a:rPr lang="bg-BG" dirty="0" smtClean="0"/>
+              <a:t>Променливите имат  име, тип и </a:t>
+            </a:r>
+            <a:r>
+              <a:rPr lang="bg-BG" dirty="0" smtClean="0"/>
+              <a:t>стойност</a:t>
+            </a:r>
+          </a:p>
+          <a:p>
+            <a:r>
+              <a:rPr lang="bg-BG" dirty="0" smtClean="0"/>
+              <a:t>Типовете</a:t>
+            </a:r>
+            <a:r>
+              <a:rPr lang="en-US" dirty="0" smtClean="0"/>
+              <a:t> </a:t>
+            </a:r>
+            <a:r>
+              <a:rPr lang="bg-BG" dirty="0" smtClean="0"/>
+              <a:t>променливи в </a:t>
+            </a:r>
+            <a:r>
+              <a:rPr lang="en-US" dirty="0" smtClean="0"/>
+              <a:t>JAVA </a:t>
+            </a:r>
+            <a:r>
+              <a:rPr lang="bg-BG" dirty="0" smtClean="0"/>
+              <a:t>са Стойностни и Референтни </a:t>
+            </a:r>
+            <a:endParaRPr lang="bg-BG" dirty="0" smtClean="0"/>
           </a:p>
           <a:p>
             <a:r>
@@ -12587,6 +13825,750 @@
       </p:par>
     </p:tnLst>
   </p:timing>
+</p:sld>
+</file>
+
+<file path=ppt/slides/slide20.xml><?xml version="1.0" encoding="utf-8"?>
+<p:sld xmlns:a="http://schemas.openxmlformats.org/drawingml/2006/main" xmlns:r="http://schemas.openxmlformats.org/officeDocument/2006/relationships" xmlns:p="http://schemas.openxmlformats.org/presentationml/2006/main">
+  <p:cSld>
+    <p:spTree>
+      <p:nvGrpSpPr>
+        <p:cNvPr id="1" name=""/>
+        <p:cNvGrpSpPr/>
+        <p:nvPr/>
+      </p:nvGrpSpPr>
+      <p:grpSpPr>
+        <a:xfrm>
+          <a:off x="0" y="0"/>
+          <a:ext cx="0" cy="0"/>
+          <a:chOff x="0" y="0"/>
+          <a:chExt cx="0" cy="0"/>
+        </a:xfrm>
+      </p:grpSpPr>
+      <p:sp>
+        <p:nvSpPr>
+          <p:cNvPr id="2" name="Title 1"/>
+          <p:cNvSpPr>
+            <a:spLocks noGrp="1"/>
+          </p:cNvSpPr>
+          <p:nvPr>
+            <p:ph type="title"/>
+          </p:nvPr>
+        </p:nvSpPr>
+        <p:spPr/>
+        <p:txBody>
+          <a:bodyPr/>
+          <a:lstStyle/>
+          <a:p>
+            <a:pPr algn="ctr"/>
+            <a:r>
+              <a:rPr lang="bg-BG" dirty="0" smtClean="0"/>
+              <a:t>Конструкция </a:t>
+            </a:r>
+            <a:r>
+              <a:rPr lang="en-US" dirty="0" err="1" smtClean="0"/>
+              <a:t>if..else</a:t>
+            </a:r>
+            <a:r>
+              <a:rPr lang="en-US" dirty="0" smtClean="0"/>
+              <a:t>..</a:t>
+            </a:r>
+            <a:endParaRPr lang="en-US" dirty="0"/>
+          </a:p>
+        </p:txBody>
+      </p:sp>
+      <p:sp>
+        <p:nvSpPr>
+          <p:cNvPr id="3" name="Content Placeholder 2"/>
+          <p:cNvSpPr>
+            <a:spLocks noGrp="1"/>
+          </p:cNvSpPr>
+          <p:nvPr>
+            <p:ph idx="1"/>
+          </p:nvPr>
+        </p:nvSpPr>
+        <p:spPr/>
+        <p:txBody>
+          <a:bodyPr>
+            <a:normAutofit fontScale="92500" lnSpcReduction="10000"/>
+          </a:bodyPr>
+          <a:lstStyle/>
+          <a:p>
+            <a:r>
+              <a:rPr lang="en-US" dirty="0" smtClean="0"/>
+              <a:t>If </a:t>
+            </a:r>
+            <a:r>
+              <a:rPr lang="bg-BG" dirty="0" smtClean="0"/>
+              <a:t>условието приема променлива от тип </a:t>
+            </a:r>
+            <a:r>
+              <a:rPr lang="en-US" dirty="0" smtClean="0"/>
+              <a:t>Boolean </a:t>
+            </a:r>
+            <a:r>
+              <a:rPr lang="bg-BG" dirty="0" smtClean="0"/>
+              <a:t>или операция, която връща </a:t>
+            </a:r>
+            <a:r>
+              <a:rPr lang="en-US" dirty="0" smtClean="0"/>
+              <a:t>Boolean</a:t>
+            </a:r>
+            <a:r>
+              <a:rPr lang="bg-BG" dirty="0" smtClean="0"/>
+              <a:t> (сравняване, логически операции)</a:t>
+            </a:r>
+          </a:p>
+          <a:p>
+            <a:r>
+              <a:rPr lang="bg-BG" dirty="0" smtClean="0"/>
+              <a:t>Ако условието върне положителен (</a:t>
+            </a:r>
+            <a:r>
+              <a:rPr lang="en-US" dirty="0" smtClean="0"/>
+              <a:t>true</a:t>
+            </a:r>
+            <a:r>
+              <a:rPr lang="bg-BG" dirty="0" smtClean="0"/>
+              <a:t>) резултат се изпълнява </a:t>
+            </a:r>
+            <a:r>
+              <a:rPr lang="en-US" dirty="0" smtClean="0"/>
+              <a:t>if </a:t>
+            </a:r>
+            <a:r>
+              <a:rPr lang="bg-BG" dirty="0" smtClean="0"/>
+              <a:t>блокът</a:t>
+            </a:r>
+          </a:p>
+          <a:p>
+            <a:r>
+              <a:rPr lang="bg-BG" dirty="0" smtClean="0"/>
+              <a:t>Ако условието върне негативен</a:t>
+            </a:r>
+            <a:r>
+              <a:rPr lang="en-US" dirty="0" smtClean="0"/>
+              <a:t> (false)</a:t>
+            </a:r>
+            <a:r>
+              <a:rPr lang="bg-BG" dirty="0" smtClean="0"/>
+              <a:t> резултат</a:t>
+            </a:r>
+            <a:r>
+              <a:rPr lang="en-US" dirty="0" smtClean="0"/>
+              <a:t> </a:t>
+            </a:r>
+            <a:r>
+              <a:rPr lang="bg-BG" dirty="0" smtClean="0"/>
+              <a:t>се изпълнява </a:t>
+            </a:r>
+            <a:r>
+              <a:rPr lang="en-US" dirty="0" smtClean="0"/>
+              <a:t>else </a:t>
+            </a:r>
+            <a:r>
+              <a:rPr lang="bg-BG" dirty="0" smtClean="0"/>
+              <a:t>блокът</a:t>
+            </a:r>
+          </a:p>
+          <a:p>
+            <a:r>
+              <a:rPr lang="en-US" dirty="0" smtClean="0"/>
+              <a:t>Else </a:t>
+            </a:r>
+            <a:r>
+              <a:rPr lang="bg-BG" dirty="0" smtClean="0"/>
+              <a:t>блокът не е задължителен</a:t>
+            </a:r>
+          </a:p>
+          <a:p>
+            <a:r>
+              <a:rPr lang="bg-BG" dirty="0" smtClean="0"/>
+              <a:t>Възможно е проверяването на няколко отделни условия чрез конструкция</a:t>
+            </a:r>
+            <a:endParaRPr lang="en-US" dirty="0" smtClean="0"/>
+          </a:p>
+          <a:p>
+            <a:pPr marL="0" indent="0">
+              <a:buNone/>
+            </a:pPr>
+            <a:r>
+              <a:rPr lang="bg-BG" dirty="0" smtClean="0"/>
+              <a:t> </a:t>
+            </a:r>
+            <a:r>
+              <a:rPr lang="en-US" dirty="0" smtClean="0"/>
+              <a:t>if .. Else if .. Else if .. else</a:t>
+            </a:r>
+            <a:endParaRPr lang="en-US" dirty="0"/>
+          </a:p>
+        </p:txBody>
+      </p:sp>
+    </p:spTree>
+    <p:extLst>
+      <p:ext uri="{BB962C8B-B14F-4D97-AF65-F5344CB8AC3E}">
+        <p14:creationId xmlns:p14="http://schemas.microsoft.com/office/powerpoint/2010/main" val="3357473248"/>
+      </p:ext>
+    </p:extLst>
+  </p:cSld>
+  <p:clrMapOvr>
+    <a:masterClrMapping/>
+  </p:clrMapOvr>
+</p:sld>
+</file>
+
+<file path=ppt/slides/slide21.xml><?xml version="1.0" encoding="utf-8"?>
+<p:sld xmlns:a="http://schemas.openxmlformats.org/drawingml/2006/main" xmlns:r="http://schemas.openxmlformats.org/officeDocument/2006/relationships" xmlns:p="http://schemas.openxmlformats.org/presentationml/2006/main">
+  <p:cSld>
+    <p:spTree>
+      <p:nvGrpSpPr>
+        <p:cNvPr id="1" name=""/>
+        <p:cNvGrpSpPr/>
+        <p:nvPr/>
+      </p:nvGrpSpPr>
+      <p:grpSpPr>
+        <a:xfrm>
+          <a:off x="0" y="0"/>
+          <a:ext cx="0" cy="0"/>
+          <a:chOff x="0" y="0"/>
+          <a:chExt cx="0" cy="0"/>
+        </a:xfrm>
+      </p:grpSpPr>
+      <p:sp>
+        <p:nvSpPr>
+          <p:cNvPr id="2" name="Title 1"/>
+          <p:cNvSpPr>
+            <a:spLocks noGrp="1"/>
+          </p:cNvSpPr>
+          <p:nvPr>
+            <p:ph type="title"/>
+          </p:nvPr>
+        </p:nvSpPr>
+        <p:spPr/>
+        <p:txBody>
+          <a:bodyPr/>
+          <a:lstStyle/>
+          <a:p>
+            <a:r>
+              <a:rPr lang="bg-BG" dirty="0"/>
+              <a:t>Конструкция </a:t>
+            </a:r>
+            <a:r>
+              <a:rPr lang="en-US" dirty="0" err="1"/>
+              <a:t>if..else</a:t>
+            </a:r>
+            <a:r>
+              <a:rPr lang="en-US" dirty="0" smtClean="0"/>
+              <a:t>.. </a:t>
+            </a:r>
+            <a:r>
+              <a:rPr lang="bg-BG" dirty="0" smtClean="0"/>
+              <a:t>демо</a:t>
+            </a:r>
+            <a:endParaRPr lang="en-US" dirty="0"/>
+          </a:p>
+        </p:txBody>
+      </p:sp>
+      <p:pic>
+        <p:nvPicPr>
+          <p:cNvPr id="4" name="Picture 2" descr="http://thejtsite.com/images/uploads/ifelsecustomfield.jpg"/>
+          <p:cNvPicPr>
+            <a:picLocks noChangeAspect="1" noChangeArrowheads="1"/>
+          </p:cNvPicPr>
+          <p:nvPr/>
+        </p:nvPicPr>
+        <p:blipFill>
+          <a:blip r:embed="rId2">
+            <a:extLst>
+              <a:ext uri="{28A0092B-C50C-407E-A947-70E740481C1C}">
+                <a14:useLocalDpi xmlns:a14="http://schemas.microsoft.com/office/drawing/2010/main" val="0"/>
+              </a:ext>
+            </a:extLst>
+          </a:blip>
+          <a:srcRect/>
+          <a:stretch>
+            <a:fillRect/>
+          </a:stretch>
+        </p:blipFill>
+        <p:spPr bwMode="auto">
+          <a:xfrm>
+            <a:off x="1887511" y="2214694"/>
+            <a:ext cx="8416977" cy="4208489"/>
+          </a:xfrm>
+          <a:prstGeom prst="rect">
+            <a:avLst/>
+          </a:prstGeom>
+          <a:noFill/>
+          <a:extLst>
+            <a:ext uri="{909E8E84-426E-40DD-AFC4-6F175D3DCCD1}">
+              <a14:hiddenFill xmlns:a14="http://schemas.microsoft.com/office/drawing/2010/main">
+                <a:solidFill>
+                  <a:srgbClr val="FFFFFF"/>
+                </a:solidFill>
+              </a14:hiddenFill>
+            </a:ext>
+          </a:extLst>
+        </p:spPr>
+      </p:pic>
+    </p:spTree>
+    <p:extLst>
+      <p:ext uri="{BB962C8B-B14F-4D97-AF65-F5344CB8AC3E}">
+        <p14:creationId xmlns:p14="http://schemas.microsoft.com/office/powerpoint/2010/main" val="2024179920"/>
+      </p:ext>
+    </p:extLst>
+  </p:cSld>
+  <p:clrMapOvr>
+    <a:masterClrMapping/>
+  </p:clrMapOvr>
+</p:sld>
+</file>
+
+<file path=ppt/slides/slide22.xml><?xml version="1.0" encoding="utf-8"?>
+<p:sld xmlns:a="http://schemas.openxmlformats.org/drawingml/2006/main" xmlns:r="http://schemas.openxmlformats.org/officeDocument/2006/relationships" xmlns:p="http://schemas.openxmlformats.org/presentationml/2006/main">
+  <p:cSld>
+    <p:spTree>
+      <p:nvGrpSpPr>
+        <p:cNvPr id="1" name=""/>
+        <p:cNvGrpSpPr/>
+        <p:nvPr/>
+      </p:nvGrpSpPr>
+      <p:grpSpPr>
+        <a:xfrm>
+          <a:off x="0" y="0"/>
+          <a:ext cx="0" cy="0"/>
+          <a:chOff x="0" y="0"/>
+          <a:chExt cx="0" cy="0"/>
+        </a:xfrm>
+      </p:grpSpPr>
+      <p:sp>
+        <p:nvSpPr>
+          <p:cNvPr id="2" name="Title 1"/>
+          <p:cNvSpPr>
+            <a:spLocks noGrp="1"/>
+          </p:cNvSpPr>
+          <p:nvPr>
+            <p:ph type="title"/>
+          </p:nvPr>
+        </p:nvSpPr>
+        <p:spPr/>
+        <p:txBody>
+          <a:bodyPr/>
+          <a:lstStyle/>
+          <a:p>
+            <a:pPr algn="ctr"/>
+            <a:r>
+              <a:rPr lang="bg-BG" dirty="0" smtClean="0"/>
+              <a:t>Конструкция </a:t>
+            </a:r>
+            <a:r>
+              <a:rPr lang="en-US" dirty="0" smtClean="0"/>
+              <a:t>switch</a:t>
+            </a:r>
+            <a:endParaRPr lang="en-US" dirty="0"/>
+          </a:p>
+        </p:txBody>
+      </p:sp>
+      <p:sp>
+        <p:nvSpPr>
+          <p:cNvPr id="3" name="Content Placeholder 2"/>
+          <p:cNvSpPr>
+            <a:spLocks noGrp="1"/>
+          </p:cNvSpPr>
+          <p:nvPr>
+            <p:ph idx="1"/>
+          </p:nvPr>
+        </p:nvSpPr>
+        <p:spPr/>
+        <p:txBody>
+          <a:bodyPr>
+            <a:normAutofit lnSpcReduction="10000"/>
+          </a:bodyPr>
+          <a:lstStyle/>
+          <a:p>
+            <a:r>
+              <a:rPr lang="bg-BG" dirty="0" smtClean="0"/>
+              <a:t>Конструкцията се изпълнява върху променлива и проверява стойността </a:t>
+            </a:r>
+          </a:p>
+          <a:p>
+            <a:r>
+              <a:rPr lang="bg-BG" dirty="0" smtClean="0"/>
+              <a:t>Всяка една отделна стойност се проверява с </a:t>
+            </a:r>
+            <a:r>
+              <a:rPr lang="en-US" dirty="0" smtClean="0"/>
+              <a:t>case</a:t>
+            </a:r>
+            <a:endParaRPr lang="bg-BG" dirty="0" smtClean="0"/>
+          </a:p>
+          <a:p>
+            <a:r>
+              <a:rPr lang="bg-BG" dirty="0" smtClean="0"/>
+              <a:t>Случаят по подразбиране се означава с </a:t>
+            </a:r>
+            <a:r>
+              <a:rPr lang="en-US" dirty="0" smtClean="0"/>
+              <a:t>default</a:t>
+            </a:r>
+            <a:endParaRPr lang="bg-BG" dirty="0" smtClean="0"/>
+          </a:p>
+          <a:p>
+            <a:r>
+              <a:rPr lang="bg-BG" dirty="0" smtClean="0"/>
+              <a:t>Подобна на </a:t>
+            </a:r>
+            <a:r>
+              <a:rPr lang="en-US" dirty="0"/>
+              <a:t>if .. Else if .. Else if .. </a:t>
+            </a:r>
+            <a:r>
+              <a:rPr lang="en-US" dirty="0" smtClean="0"/>
+              <a:t>Else</a:t>
+            </a:r>
+            <a:r>
+              <a:rPr lang="bg-BG" dirty="0" smtClean="0"/>
+              <a:t> конструкцията</a:t>
+            </a:r>
+            <a:endParaRPr lang="en-US" dirty="0"/>
+          </a:p>
+          <a:p>
+            <a:r>
+              <a:rPr lang="bg-BG" dirty="0" smtClean="0"/>
+              <a:t>Всяка </a:t>
+            </a:r>
+            <a:r>
+              <a:rPr lang="en-US" dirty="0" smtClean="0"/>
+              <a:t>switch </a:t>
+            </a:r>
+            <a:r>
+              <a:rPr lang="bg-BG" dirty="0" smtClean="0"/>
+              <a:t>конструкция може да се сведе до </a:t>
+            </a:r>
+            <a:r>
+              <a:rPr lang="en-US" dirty="0"/>
+              <a:t>if .. Else if .. Else if .. Else</a:t>
+            </a:r>
+            <a:r>
+              <a:rPr lang="bg-BG" dirty="0"/>
+              <a:t> </a:t>
+            </a:r>
+            <a:r>
+              <a:rPr lang="bg-BG" dirty="0" smtClean="0"/>
+              <a:t>такава, но не всяка </a:t>
+            </a:r>
+            <a:r>
+              <a:rPr lang="en-US" dirty="0"/>
+              <a:t>if .. Else if .. Else if .. Else</a:t>
+            </a:r>
+            <a:r>
+              <a:rPr lang="bg-BG" dirty="0"/>
+              <a:t> </a:t>
+            </a:r>
+            <a:r>
+              <a:rPr lang="bg-BG" dirty="0" err="1" smtClean="0"/>
+              <a:t>конструкцкия</a:t>
+            </a:r>
+            <a:r>
+              <a:rPr lang="bg-BG" dirty="0" smtClean="0"/>
+              <a:t> може да се сведе до </a:t>
+            </a:r>
+            <a:r>
+              <a:rPr lang="en-US" dirty="0" smtClean="0"/>
+              <a:t>switch </a:t>
+            </a:r>
+            <a:r>
+              <a:rPr lang="bg-BG" dirty="0" smtClean="0"/>
+              <a:t>такава</a:t>
+            </a:r>
+            <a:endParaRPr lang="en-US" dirty="0"/>
+          </a:p>
+        </p:txBody>
+      </p:sp>
+    </p:spTree>
+    <p:extLst>
+      <p:ext uri="{BB962C8B-B14F-4D97-AF65-F5344CB8AC3E}">
+        <p14:creationId xmlns:p14="http://schemas.microsoft.com/office/powerpoint/2010/main" val="3048028170"/>
+      </p:ext>
+    </p:extLst>
+  </p:cSld>
+  <p:clrMapOvr>
+    <a:masterClrMapping/>
+  </p:clrMapOvr>
+</p:sld>
+</file>
+
+<file path=ppt/slides/slide23.xml><?xml version="1.0" encoding="utf-8"?>
+<p:sld xmlns:a="http://schemas.openxmlformats.org/drawingml/2006/main" xmlns:r="http://schemas.openxmlformats.org/officeDocument/2006/relationships" xmlns:p="http://schemas.openxmlformats.org/presentationml/2006/main">
+  <p:cSld>
+    <p:spTree>
+      <p:nvGrpSpPr>
+        <p:cNvPr id="1" name=""/>
+        <p:cNvGrpSpPr/>
+        <p:nvPr/>
+      </p:nvGrpSpPr>
+      <p:grpSpPr>
+        <a:xfrm>
+          <a:off x="0" y="0"/>
+          <a:ext cx="0" cy="0"/>
+          <a:chOff x="0" y="0"/>
+          <a:chExt cx="0" cy="0"/>
+        </a:xfrm>
+      </p:grpSpPr>
+      <p:sp>
+        <p:nvSpPr>
+          <p:cNvPr id="2" name="Title 1"/>
+          <p:cNvSpPr>
+            <a:spLocks noGrp="1"/>
+          </p:cNvSpPr>
+          <p:nvPr>
+            <p:ph type="title"/>
+          </p:nvPr>
+        </p:nvSpPr>
+        <p:spPr/>
+        <p:txBody>
+          <a:bodyPr/>
+          <a:lstStyle/>
+          <a:p>
+            <a:pPr algn="ctr"/>
+            <a:r>
+              <a:rPr lang="bg-BG" dirty="0"/>
+              <a:t>Конструкция </a:t>
+            </a:r>
+            <a:r>
+              <a:rPr lang="en-US" dirty="0" smtClean="0"/>
+              <a:t>switch</a:t>
+            </a:r>
+            <a:r>
+              <a:rPr lang="bg-BG" dirty="0" smtClean="0"/>
+              <a:t> демо</a:t>
+            </a:r>
+            <a:endParaRPr lang="en-US" dirty="0"/>
+          </a:p>
+        </p:txBody>
+      </p:sp>
+      <p:pic>
+        <p:nvPicPr>
+          <p:cNvPr id="10242" name="Picture 2" descr="http://3.bp.blogspot.com/-1dtEACxUddY/T3tOkjkPf-I/AAAAAAAAAG4/qgTf4-07VT4/s1600/switch.jpg"/>
+          <p:cNvPicPr>
+            <a:picLocks noChangeAspect="1" noChangeArrowheads="1"/>
+          </p:cNvPicPr>
+          <p:nvPr/>
+        </p:nvPicPr>
+        <p:blipFill>
+          <a:blip r:embed="rId2">
+            <a:extLst>
+              <a:ext uri="{28A0092B-C50C-407E-A947-70E740481C1C}">
+                <a14:useLocalDpi xmlns:a14="http://schemas.microsoft.com/office/drawing/2010/main" val="0"/>
+              </a:ext>
+            </a:extLst>
+          </a:blip>
+          <a:srcRect/>
+          <a:stretch>
+            <a:fillRect/>
+          </a:stretch>
+        </p:blipFill>
+        <p:spPr bwMode="auto">
+          <a:xfrm>
+            <a:off x="4126426" y="2005625"/>
+            <a:ext cx="3935971" cy="4727564"/>
+          </a:xfrm>
+          <a:prstGeom prst="rect">
+            <a:avLst/>
+          </a:prstGeom>
+          <a:noFill/>
+          <a:extLst>
+            <a:ext uri="{909E8E84-426E-40DD-AFC4-6F175D3DCCD1}">
+              <a14:hiddenFill xmlns:a14="http://schemas.microsoft.com/office/drawing/2010/main">
+                <a:solidFill>
+                  <a:srgbClr val="FFFFFF"/>
+                </a:solidFill>
+              </a14:hiddenFill>
+            </a:ext>
+          </a:extLst>
+        </p:spPr>
+      </p:pic>
+    </p:spTree>
+    <p:extLst>
+      <p:ext uri="{BB962C8B-B14F-4D97-AF65-F5344CB8AC3E}">
+        <p14:creationId xmlns:p14="http://schemas.microsoft.com/office/powerpoint/2010/main" val="2774657437"/>
+      </p:ext>
+    </p:extLst>
+  </p:cSld>
+  <p:clrMapOvr>
+    <a:masterClrMapping/>
+  </p:clrMapOvr>
+</p:sld>
+</file>
+
+<file path=ppt/slides/slide24.xml><?xml version="1.0" encoding="utf-8"?>
+<p:sld xmlns:a="http://schemas.openxmlformats.org/drawingml/2006/main" xmlns:r="http://schemas.openxmlformats.org/officeDocument/2006/relationships" xmlns:p="http://schemas.openxmlformats.org/presentationml/2006/main">
+  <p:cSld>
+    <p:spTree>
+      <p:nvGrpSpPr>
+        <p:cNvPr id="1" name=""/>
+        <p:cNvGrpSpPr/>
+        <p:nvPr/>
+      </p:nvGrpSpPr>
+      <p:grpSpPr>
+        <a:xfrm>
+          <a:off x="0" y="0"/>
+          <a:ext cx="0" cy="0"/>
+          <a:chOff x="0" y="0"/>
+          <a:chExt cx="0" cy="0"/>
+        </a:xfrm>
+      </p:grpSpPr>
+      <p:sp>
+        <p:nvSpPr>
+          <p:cNvPr id="2" name="Title 1"/>
+          <p:cNvSpPr>
+            <a:spLocks noGrp="1"/>
+          </p:cNvSpPr>
+          <p:nvPr>
+            <p:ph type="title"/>
+          </p:nvPr>
+        </p:nvSpPr>
+        <p:spPr/>
+        <p:txBody>
+          <a:bodyPr/>
+          <a:lstStyle/>
+          <a:p>
+            <a:pPr algn="ctr"/>
+            <a:r>
+              <a:rPr lang="bg-BG" dirty="0" smtClean="0"/>
+              <a:t>Задача</a:t>
+            </a:r>
+            <a:endParaRPr lang="en-US" dirty="0"/>
+          </a:p>
+        </p:txBody>
+      </p:sp>
+      <p:sp>
+        <p:nvSpPr>
+          <p:cNvPr id="3" name="Content Placeholder 2"/>
+          <p:cNvSpPr>
+            <a:spLocks noGrp="1"/>
+          </p:cNvSpPr>
+          <p:nvPr>
+            <p:ph idx="1"/>
+          </p:nvPr>
+        </p:nvSpPr>
+        <p:spPr/>
+        <p:txBody>
+          <a:bodyPr/>
+          <a:lstStyle/>
+          <a:p>
+            <a:r>
+              <a:rPr lang="bg-BG" dirty="0" smtClean="0"/>
+              <a:t>Направете програма, която чете от конзолата 3 числа и извежда кое е най-голямото и кое е най-малкото число от трите</a:t>
+            </a:r>
+            <a:endParaRPr lang="en-US" dirty="0"/>
+          </a:p>
+        </p:txBody>
+      </p:sp>
+    </p:spTree>
+    <p:extLst>
+      <p:ext uri="{BB962C8B-B14F-4D97-AF65-F5344CB8AC3E}">
+        <p14:creationId xmlns:p14="http://schemas.microsoft.com/office/powerpoint/2010/main" val="3330359753"/>
+      </p:ext>
+    </p:extLst>
+  </p:cSld>
+  <p:clrMapOvr>
+    <a:masterClrMapping/>
+  </p:clrMapOvr>
+</p:sld>
+</file>
+
+<file path=ppt/slides/slide25.xml><?xml version="1.0" encoding="utf-8"?>
+<p:sld xmlns:a="http://schemas.openxmlformats.org/drawingml/2006/main" xmlns:r="http://schemas.openxmlformats.org/officeDocument/2006/relationships" xmlns:p="http://schemas.openxmlformats.org/presentationml/2006/main">
+  <p:cSld>
+    <p:spTree>
+      <p:nvGrpSpPr>
+        <p:cNvPr id="1" name=""/>
+        <p:cNvGrpSpPr/>
+        <p:nvPr/>
+      </p:nvGrpSpPr>
+      <p:grpSpPr>
+        <a:xfrm>
+          <a:off x="0" y="0"/>
+          <a:ext cx="0" cy="0"/>
+          <a:chOff x="0" y="0"/>
+          <a:chExt cx="0" cy="0"/>
+        </a:xfrm>
+      </p:grpSpPr>
+      <p:sp>
+        <p:nvSpPr>
+          <p:cNvPr id="2" name="Title 1"/>
+          <p:cNvSpPr>
+            <a:spLocks noGrp="1"/>
+          </p:cNvSpPr>
+          <p:nvPr>
+            <p:ph type="title"/>
+          </p:nvPr>
+        </p:nvSpPr>
+        <p:spPr/>
+        <p:txBody>
+          <a:bodyPr/>
+          <a:lstStyle/>
+          <a:p>
+            <a:pPr algn="ctr"/>
+            <a:r>
+              <a:rPr lang="bg-BG" dirty="0" smtClean="0"/>
+              <a:t>Въпроси</a:t>
+            </a:r>
+            <a:endParaRPr lang="en-US" dirty="0"/>
+          </a:p>
+        </p:txBody>
+      </p:sp>
+      <p:pic>
+        <p:nvPicPr>
+          <p:cNvPr id="4" name="Picture 2" descr="http://en.hdyo.org/assets/ask-question-3-2d87064cddbd5d5eb6f24d40d6b8ba02.jpg"/>
+          <p:cNvPicPr>
+            <a:picLocks noChangeAspect="1" noChangeArrowheads="1"/>
+          </p:cNvPicPr>
+          <p:nvPr/>
+        </p:nvPicPr>
+        <p:blipFill>
+          <a:blip r:embed="rId2">
+            <a:extLst>
+              <a:ext uri="{28A0092B-C50C-407E-A947-70E740481C1C}">
+                <a14:useLocalDpi xmlns:a14="http://schemas.microsoft.com/office/drawing/2010/main" val="0"/>
+              </a:ext>
+            </a:extLst>
+          </a:blip>
+          <a:srcRect/>
+          <a:stretch>
+            <a:fillRect/>
+          </a:stretch>
+        </p:blipFill>
+        <p:spPr bwMode="auto">
+          <a:xfrm>
+            <a:off x="3652277" y="2280240"/>
+            <a:ext cx="4887445" cy="4164104"/>
+          </a:xfrm>
+          <a:prstGeom prst="rect">
+            <a:avLst/>
+          </a:prstGeom>
+          <a:noFill/>
+          <a:extLst>
+            <a:ext uri="{909E8E84-426E-40DD-AFC4-6F175D3DCCD1}">
+              <a14:hiddenFill xmlns:a14="http://schemas.microsoft.com/office/drawing/2010/main">
+                <a:solidFill>
+                  <a:srgbClr val="FFFFFF"/>
+                </a:solidFill>
+              </a14:hiddenFill>
+            </a:ext>
+          </a:extLst>
+        </p:spPr>
+      </p:pic>
+    </p:spTree>
+    <p:extLst>
+      <p:ext uri="{BB962C8B-B14F-4D97-AF65-F5344CB8AC3E}">
+        <p14:creationId xmlns:p14="http://schemas.microsoft.com/office/powerpoint/2010/main" val="4240842708"/>
+      </p:ext>
+    </p:extLst>
+  </p:cSld>
+  <p:clrMapOvr>
+    <a:masterClrMapping/>
+  </p:clrMapOvr>
 </p:sld>
 </file>
 
@@ -12617,6 +14599,389 @@
             <p:ph type="title"/>
           </p:nvPr>
         </p:nvSpPr>
+        <p:spPr>
+          <a:xfrm>
+            <a:off x="1141413" y="618518"/>
+            <a:ext cx="9905998" cy="971385"/>
+          </a:xfrm>
+        </p:spPr>
+        <p:txBody>
+          <a:bodyPr/>
+          <a:lstStyle/>
+          <a:p>
+            <a:pPr algn="ctr"/>
+            <a:r>
+              <a:rPr lang="bg-BG" dirty="0" smtClean="0"/>
+              <a:t>Примитивни типове данни</a:t>
+            </a:r>
+            <a:endParaRPr lang="en-US" dirty="0"/>
+          </a:p>
+        </p:txBody>
+      </p:sp>
+      <p:sp>
+        <p:nvSpPr>
+          <p:cNvPr id="3" name="Content Placeholder 2"/>
+          <p:cNvSpPr>
+            <a:spLocks noGrp="1"/>
+          </p:cNvSpPr>
+          <p:nvPr>
+            <p:ph idx="1"/>
+          </p:nvPr>
+        </p:nvSpPr>
+        <p:spPr>
+          <a:xfrm>
+            <a:off x="1141412" y="1589903"/>
+            <a:ext cx="9905999" cy="5156886"/>
+          </a:xfrm>
+        </p:spPr>
+        <p:txBody>
+          <a:bodyPr>
+            <a:normAutofit lnSpcReduction="10000"/>
+          </a:bodyPr>
+          <a:lstStyle/>
+          <a:p>
+            <a:r>
+              <a:rPr lang="en-US" dirty="0" smtClean="0"/>
+              <a:t>Byte - </a:t>
+            </a:r>
+            <a:r>
+              <a:rPr lang="bg-BG" dirty="0" smtClean="0"/>
+              <a:t>стойностен тип 8 бита</a:t>
+            </a:r>
+            <a:r>
+              <a:rPr lang="en-US" dirty="0" smtClean="0"/>
+              <a:t>, default 0</a:t>
+            </a:r>
+            <a:endParaRPr lang="bg-BG" dirty="0" smtClean="0"/>
+          </a:p>
+          <a:p>
+            <a:r>
+              <a:rPr lang="en-US" dirty="0" smtClean="0"/>
+              <a:t>Short - </a:t>
+            </a:r>
+            <a:r>
+              <a:rPr lang="bg-BG" dirty="0"/>
+              <a:t>стойностен тип </a:t>
+            </a:r>
+            <a:r>
+              <a:rPr lang="en-US" dirty="0" smtClean="0"/>
+              <a:t>16</a:t>
+            </a:r>
+            <a:r>
+              <a:rPr lang="bg-BG" dirty="0" smtClean="0"/>
+              <a:t> </a:t>
+            </a:r>
+            <a:r>
+              <a:rPr lang="bg-BG" dirty="0"/>
+              <a:t>бита</a:t>
+            </a:r>
+            <a:r>
+              <a:rPr lang="en-US" dirty="0"/>
+              <a:t>, default 0</a:t>
+            </a:r>
+            <a:endParaRPr lang="bg-BG" dirty="0" smtClean="0"/>
+          </a:p>
+          <a:p>
+            <a:r>
+              <a:rPr lang="en-US" dirty="0" err="1" smtClean="0"/>
+              <a:t>Int</a:t>
+            </a:r>
+            <a:r>
+              <a:rPr lang="en-US" dirty="0" smtClean="0"/>
+              <a:t> -</a:t>
+            </a:r>
+            <a:r>
+              <a:rPr lang="bg-BG" dirty="0" smtClean="0"/>
+              <a:t> стойностен тип,</a:t>
+            </a:r>
+            <a:r>
+              <a:rPr lang="en-US" dirty="0" smtClean="0"/>
+              <a:t> 32 </a:t>
+            </a:r>
+            <a:r>
+              <a:rPr lang="bg-BG" dirty="0" smtClean="0"/>
+              <a:t>бита,</a:t>
+            </a:r>
+            <a:r>
+              <a:rPr lang="en-US" dirty="0" smtClean="0"/>
+              <a:t> default 0</a:t>
+            </a:r>
+          </a:p>
+          <a:p>
+            <a:r>
+              <a:rPr lang="en-US" dirty="0" smtClean="0"/>
+              <a:t>long </a:t>
+            </a:r>
+            <a:r>
+              <a:rPr lang="en-US" dirty="0"/>
+              <a:t>-</a:t>
+            </a:r>
+            <a:r>
+              <a:rPr lang="bg-BG" dirty="0"/>
+              <a:t> стойностен тип,</a:t>
+            </a:r>
+            <a:r>
+              <a:rPr lang="en-US" dirty="0"/>
+              <a:t> </a:t>
+            </a:r>
+            <a:r>
+              <a:rPr lang="en-US" dirty="0" smtClean="0"/>
+              <a:t>64 </a:t>
+            </a:r>
+            <a:r>
+              <a:rPr lang="bg-BG" dirty="0"/>
+              <a:t>бита,</a:t>
+            </a:r>
+            <a:r>
+              <a:rPr lang="en-US" dirty="0"/>
+              <a:t> default </a:t>
+            </a:r>
+            <a:r>
+              <a:rPr lang="en-US" dirty="0" smtClean="0"/>
+              <a:t>0L</a:t>
+            </a:r>
+          </a:p>
+          <a:p>
+            <a:r>
+              <a:rPr lang="en-US" dirty="0" smtClean="0"/>
+              <a:t>Float </a:t>
+            </a:r>
+            <a:r>
+              <a:rPr lang="bg-BG" dirty="0" smtClean="0"/>
+              <a:t>стойностен тип 32 бита, точност 7 символа след запетаята</a:t>
+            </a:r>
+            <a:r>
+              <a:rPr lang="en-US" dirty="0" smtClean="0"/>
+              <a:t>, default 0.0f</a:t>
+            </a:r>
+            <a:endParaRPr lang="bg-BG" dirty="0" smtClean="0"/>
+          </a:p>
+          <a:p>
+            <a:r>
+              <a:rPr lang="en-US" dirty="0" smtClean="0"/>
+              <a:t>Double </a:t>
+            </a:r>
+            <a:r>
+              <a:rPr lang="bg-BG" dirty="0" smtClean="0"/>
+              <a:t>стойностен тип 64 бита, точност 15 символа след запетаята</a:t>
+            </a:r>
+            <a:r>
+              <a:rPr lang="en-US" dirty="0" smtClean="0"/>
+              <a:t>, default 0.0d</a:t>
+            </a:r>
+            <a:endParaRPr lang="bg-BG" dirty="0" smtClean="0"/>
+          </a:p>
+          <a:p>
+            <a:r>
+              <a:rPr lang="en-US" dirty="0" smtClean="0"/>
+              <a:t>Boolean </a:t>
+            </a:r>
+            <a:r>
+              <a:rPr lang="bg-BG" dirty="0" smtClean="0"/>
+              <a:t>стойностен тип 1 бит, </a:t>
+            </a:r>
+            <a:r>
+              <a:rPr lang="en-US" dirty="0" smtClean="0"/>
+              <a:t>default false</a:t>
+            </a:r>
+          </a:p>
+          <a:p>
+            <a:r>
+              <a:rPr lang="en-US" dirty="0" smtClean="0"/>
+              <a:t>Char – </a:t>
+            </a:r>
+            <a:r>
+              <a:rPr lang="bg-BG" dirty="0" smtClean="0"/>
+              <a:t>стойностен тип</a:t>
+            </a:r>
+            <a:r>
+              <a:rPr lang="en-US" dirty="0" smtClean="0"/>
+              <a:t>, 16 </a:t>
+            </a:r>
+            <a:r>
+              <a:rPr lang="bg-BG" dirty="0" smtClean="0"/>
+              <a:t>бита, </a:t>
+            </a:r>
+            <a:r>
+              <a:rPr lang="en-US" dirty="0" smtClean="0"/>
+              <a:t>default </a:t>
+            </a:r>
+            <a:r>
+              <a:rPr lang="bg-BG" dirty="0" smtClean="0"/>
+              <a:t>‚‘</a:t>
+            </a:r>
+            <a:r>
+              <a:rPr lang="en-US" dirty="0" smtClean="0"/>
+              <a:t>\u0000</a:t>
+            </a:r>
+            <a:r>
+              <a:rPr lang="bg-BG" dirty="0" smtClean="0"/>
+              <a:t>‘,</a:t>
+            </a:r>
+          </a:p>
+          <a:p>
+            <a:pPr marL="0" indent="0">
+              <a:buNone/>
+            </a:pPr>
+            <a:endParaRPr lang="bg-BG" dirty="0" smtClean="0"/>
+          </a:p>
+          <a:p>
+            <a:endParaRPr lang="bg-BG" dirty="0" smtClean="0"/>
+          </a:p>
+          <a:p>
+            <a:endParaRPr lang="bg-BG" dirty="0" smtClean="0"/>
+          </a:p>
+          <a:p>
+            <a:endParaRPr lang="en-US" dirty="0" smtClean="0"/>
+          </a:p>
+          <a:p>
+            <a:endParaRPr lang="en-US" dirty="0" smtClean="0"/>
+          </a:p>
+          <a:p>
+            <a:endParaRPr lang="en-US" dirty="0"/>
+          </a:p>
+        </p:txBody>
+      </p:sp>
+    </p:spTree>
+    <p:extLst>
+      <p:ext uri="{BB962C8B-B14F-4D97-AF65-F5344CB8AC3E}">
+        <p14:creationId xmlns:p14="http://schemas.microsoft.com/office/powerpoint/2010/main" val="1911184578"/>
+      </p:ext>
+    </p:extLst>
+  </p:cSld>
+  <p:clrMapOvr>
+    <a:masterClrMapping/>
+  </p:clrMapOvr>
+</p:sld>
+</file>
+
+<file path=ppt/slides/slide4.xml><?xml version="1.0" encoding="utf-8"?>
+<p:sld xmlns:a="http://schemas.openxmlformats.org/drawingml/2006/main" xmlns:r="http://schemas.openxmlformats.org/officeDocument/2006/relationships" xmlns:p="http://schemas.openxmlformats.org/presentationml/2006/main">
+  <p:cSld>
+    <p:spTree>
+      <p:nvGrpSpPr>
+        <p:cNvPr id="1" name=""/>
+        <p:cNvGrpSpPr/>
+        <p:nvPr/>
+      </p:nvGrpSpPr>
+      <p:grpSpPr>
+        <a:xfrm>
+          <a:off x="0" y="0"/>
+          <a:ext cx="0" cy="0"/>
+          <a:chOff x="0" y="0"/>
+          <a:chExt cx="0" cy="0"/>
+        </a:xfrm>
+      </p:grpSpPr>
+      <p:sp>
+        <p:nvSpPr>
+          <p:cNvPr id="2" name="Title 1"/>
+          <p:cNvSpPr>
+            <a:spLocks noGrp="1"/>
+          </p:cNvSpPr>
+          <p:nvPr>
+            <p:ph type="title"/>
+          </p:nvPr>
+        </p:nvSpPr>
+        <p:spPr>
+          <a:xfrm>
+            <a:off x="1141413" y="618518"/>
+            <a:ext cx="9905998" cy="1045525"/>
+          </a:xfrm>
+        </p:spPr>
+        <p:txBody>
+          <a:bodyPr/>
+          <a:lstStyle/>
+          <a:p>
+            <a:pPr algn="ctr"/>
+            <a:r>
+              <a:rPr lang="bg-BG" dirty="0" smtClean="0"/>
+              <a:t>Променливи ДЕМО</a:t>
+            </a:r>
+            <a:endParaRPr lang="en-US" dirty="0"/>
+          </a:p>
+        </p:txBody>
+      </p:sp>
+      <p:pic>
+        <p:nvPicPr>
+          <p:cNvPr id="1028" name="Picture 4" descr="http://aas9.in/wp-content/uploads/2013/04/java11.png"/>
+          <p:cNvPicPr>
+            <a:picLocks noChangeAspect="1" noChangeArrowheads="1"/>
+          </p:cNvPicPr>
+          <p:nvPr/>
+        </p:nvPicPr>
+        <p:blipFill>
+          <a:blip r:embed="rId2">
+            <a:extLst>
+              <a:ext uri="{28A0092B-C50C-407E-A947-70E740481C1C}">
+                <a14:useLocalDpi xmlns:a14="http://schemas.microsoft.com/office/drawing/2010/main" val="0"/>
+              </a:ext>
+            </a:extLst>
+          </a:blip>
+          <a:srcRect/>
+          <a:stretch>
+            <a:fillRect/>
+          </a:stretch>
+        </p:blipFill>
+        <p:spPr bwMode="auto">
+          <a:xfrm>
+            <a:off x="1920299" y="1664043"/>
+            <a:ext cx="8348225" cy="4637903"/>
+          </a:xfrm>
+          <a:prstGeom prst="rect">
+            <a:avLst/>
+          </a:prstGeom>
+          <a:noFill/>
+          <a:extLst>
+            <a:ext uri="{909E8E84-426E-40DD-AFC4-6F175D3DCCD1}">
+              <a14:hiddenFill xmlns:a14="http://schemas.microsoft.com/office/drawing/2010/main">
+                <a:solidFill>
+                  <a:srgbClr val="FFFFFF"/>
+                </a:solidFill>
+              </a14:hiddenFill>
+            </a:ext>
+          </a:extLst>
+        </p:spPr>
+      </p:pic>
+    </p:spTree>
+    <p:extLst>
+      <p:ext uri="{BB962C8B-B14F-4D97-AF65-F5344CB8AC3E}">
+        <p14:creationId xmlns:p14="http://schemas.microsoft.com/office/powerpoint/2010/main" val="1149376270"/>
+      </p:ext>
+    </p:extLst>
+  </p:cSld>
+  <p:clrMapOvr>
+    <a:masterClrMapping/>
+  </p:clrMapOvr>
+</p:sld>
+</file>
+
+<file path=ppt/slides/slide5.xml><?xml version="1.0" encoding="utf-8"?>
+<p:sld xmlns:a="http://schemas.openxmlformats.org/drawingml/2006/main" xmlns:r="http://schemas.openxmlformats.org/officeDocument/2006/relationships" xmlns:p="http://schemas.openxmlformats.org/presentationml/2006/main">
+  <p:cSld>
+    <p:spTree>
+      <p:nvGrpSpPr>
+        <p:cNvPr id="1" name=""/>
+        <p:cNvGrpSpPr/>
+        <p:nvPr/>
+      </p:nvGrpSpPr>
+      <p:grpSpPr>
+        <a:xfrm>
+          <a:off x="0" y="0"/>
+          <a:ext cx="0" cy="0"/>
+          <a:chOff x="0" y="0"/>
+          <a:chExt cx="0" cy="0"/>
+        </a:xfrm>
+      </p:grpSpPr>
+      <p:sp>
+        <p:nvSpPr>
+          <p:cNvPr id="2" name="Title 1"/>
+          <p:cNvSpPr>
+            <a:spLocks noGrp="1"/>
+          </p:cNvSpPr>
+          <p:nvPr>
+            <p:ph type="title"/>
+          </p:nvPr>
+        </p:nvSpPr>
         <p:spPr/>
         <p:txBody>
           <a:bodyPr/>
@@ -12625,7 +14990,303 @@
             <a:pPr algn="ctr"/>
             <a:r>
               <a:rPr lang="bg-BG" dirty="0" smtClean="0"/>
-              <a:t>Променливи ДЕМО</a:t>
+              <a:t>тип </a:t>
+            </a:r>
+            <a:r>
+              <a:rPr lang="en-US" dirty="0" smtClean="0"/>
+              <a:t>STRING </a:t>
+            </a:r>
+            <a:r>
+              <a:rPr lang="bg-BG" dirty="0" smtClean="0"/>
+              <a:t>В</a:t>
+            </a:r>
+            <a:r>
+              <a:rPr lang="en-US" dirty="0" smtClean="0"/>
+              <a:t> java</a:t>
+            </a:r>
+            <a:endParaRPr lang="en-US" dirty="0"/>
+          </a:p>
+        </p:txBody>
+      </p:sp>
+      <p:sp>
+        <p:nvSpPr>
+          <p:cNvPr id="3" name="Content Placeholder 2"/>
+          <p:cNvSpPr>
+            <a:spLocks noGrp="1"/>
+          </p:cNvSpPr>
+          <p:nvPr>
+            <p:ph idx="1"/>
+          </p:nvPr>
+        </p:nvSpPr>
+        <p:spPr/>
+        <p:txBody>
+          <a:bodyPr>
+            <a:normAutofit fontScale="70000" lnSpcReduction="20000"/>
+          </a:bodyPr>
+          <a:lstStyle/>
+          <a:p>
+            <a:r>
+              <a:rPr lang="bg-BG" dirty="0" smtClean="0"/>
+              <a:t>Референтен тип</a:t>
+            </a:r>
+            <a:endParaRPr lang="en-US" dirty="0" smtClean="0"/>
+          </a:p>
+          <a:p>
+            <a:r>
+              <a:rPr lang="bg-BG" dirty="0" smtClean="0"/>
+              <a:t>Представя поредица от символи (текст)</a:t>
+            </a:r>
+          </a:p>
+          <a:p>
+            <a:r>
+              <a:rPr lang="bg-BG" dirty="0" smtClean="0"/>
+              <a:t>Размерът на променливата се определя от броя символи</a:t>
+            </a:r>
+          </a:p>
+          <a:p>
+            <a:r>
+              <a:rPr lang="en-US" dirty="0" smtClean="0"/>
+              <a:t>Default null</a:t>
+            </a:r>
+            <a:endParaRPr lang="bg-BG" dirty="0" smtClean="0"/>
+          </a:p>
+          <a:p>
+            <a:r>
+              <a:rPr lang="en-US" dirty="0" smtClean="0"/>
+              <a:t>Immutable (</a:t>
+            </a:r>
+            <a:r>
+              <a:rPr lang="bg-BG" dirty="0" smtClean="0"/>
+              <a:t>непроменим</a:t>
+            </a:r>
+            <a:r>
+              <a:rPr lang="en-US" dirty="0" smtClean="0"/>
+              <a:t>) </a:t>
+            </a:r>
+            <a:r>
+              <a:rPr lang="bg-BG" dirty="0" smtClean="0"/>
+              <a:t>тип</a:t>
+            </a:r>
+          </a:p>
+          <a:p>
+            <a:r>
+              <a:rPr lang="bg-BG" dirty="0" smtClean="0"/>
+              <a:t>Стрингове могат да се събират (долепят) чрез конкатенация</a:t>
+            </a:r>
+            <a:endParaRPr lang="en-US" dirty="0" smtClean="0"/>
+          </a:p>
+          <a:p>
+            <a:r>
+              <a:rPr lang="bg-BG" dirty="0" smtClean="0"/>
+              <a:t>Конкатенацията се извършва с оператора +</a:t>
+            </a:r>
+          </a:p>
+          <a:p>
+            <a:r>
+              <a:rPr lang="bg-BG" dirty="0" smtClean="0"/>
+              <a:t>Броя символи от които се състои променлива от тип </a:t>
+            </a:r>
+            <a:r>
+              <a:rPr lang="en-US" dirty="0" smtClean="0"/>
+              <a:t>String </a:t>
+            </a:r>
+            <a:r>
+              <a:rPr lang="bg-BG" dirty="0" smtClean="0"/>
+              <a:t>може да се провери чрез функцията </a:t>
+            </a:r>
+            <a:r>
+              <a:rPr lang="en-US" dirty="0" smtClean="0"/>
+              <a:t>length</a:t>
+            </a:r>
+            <a:endParaRPr lang="bg-BG" dirty="0" smtClean="0"/>
+          </a:p>
+          <a:p>
+            <a:endParaRPr lang="en-US" dirty="0" smtClean="0"/>
+          </a:p>
+          <a:p>
+            <a:endParaRPr lang="bg-BG" dirty="0" smtClean="0"/>
+          </a:p>
+          <a:p>
+            <a:endParaRPr lang="en-US" dirty="0"/>
+          </a:p>
+        </p:txBody>
+      </p:sp>
+    </p:spTree>
+    <p:extLst>
+      <p:ext uri="{BB962C8B-B14F-4D97-AF65-F5344CB8AC3E}">
+        <p14:creationId xmlns:p14="http://schemas.microsoft.com/office/powerpoint/2010/main" val="1045795801"/>
+      </p:ext>
+    </p:extLst>
+  </p:cSld>
+  <p:clrMapOvr>
+    <a:masterClrMapping/>
+  </p:clrMapOvr>
+</p:sld>
+</file>
+
+<file path=ppt/slides/slide6.xml><?xml version="1.0" encoding="utf-8"?>
+<p:sld xmlns:a="http://schemas.openxmlformats.org/drawingml/2006/main" xmlns:r="http://schemas.openxmlformats.org/officeDocument/2006/relationships" xmlns:p="http://schemas.openxmlformats.org/presentationml/2006/main">
+  <p:cSld>
+    <p:spTree>
+      <p:nvGrpSpPr>
+        <p:cNvPr id="1" name=""/>
+        <p:cNvGrpSpPr/>
+        <p:nvPr/>
+      </p:nvGrpSpPr>
+      <p:grpSpPr>
+        <a:xfrm>
+          <a:off x="0" y="0"/>
+          <a:ext cx="0" cy="0"/>
+          <a:chOff x="0" y="0"/>
+          <a:chExt cx="0" cy="0"/>
+        </a:xfrm>
+      </p:grpSpPr>
+      <p:sp>
+        <p:nvSpPr>
+          <p:cNvPr id="2" name="Title 1"/>
+          <p:cNvSpPr>
+            <a:spLocks noGrp="1"/>
+          </p:cNvSpPr>
+          <p:nvPr>
+            <p:ph type="title"/>
+          </p:nvPr>
+        </p:nvSpPr>
+        <p:spPr/>
+        <p:txBody>
+          <a:bodyPr/>
+          <a:lstStyle/>
+          <a:p>
+            <a:pPr algn="ctr"/>
+            <a:r>
+              <a:rPr lang="bg-BG" dirty="0"/>
+              <a:t>тип </a:t>
+            </a:r>
+            <a:r>
+              <a:rPr lang="en-US" dirty="0"/>
+              <a:t>STRING </a:t>
+            </a:r>
+            <a:r>
+              <a:rPr lang="bg-BG" dirty="0"/>
+              <a:t>В</a:t>
+            </a:r>
+            <a:r>
+              <a:rPr lang="en-US" dirty="0"/>
+              <a:t> </a:t>
+            </a:r>
+            <a:r>
+              <a:rPr lang="en-US" dirty="0" smtClean="0"/>
+              <a:t>java</a:t>
+            </a:r>
+            <a:r>
+              <a:rPr lang="bg-BG" dirty="0" smtClean="0"/>
+              <a:t> демо</a:t>
+            </a:r>
+            <a:endParaRPr lang="en-US" dirty="0"/>
+          </a:p>
+        </p:txBody>
+      </p:sp>
+      <p:pic>
+        <p:nvPicPr>
+          <p:cNvPr id="2050" name="Picture 2" descr="http://codingbat.com/doc/string1.png"/>
+          <p:cNvPicPr>
+            <a:picLocks noChangeAspect="1" noChangeArrowheads="1"/>
+          </p:cNvPicPr>
+          <p:nvPr/>
+        </p:nvPicPr>
+        <p:blipFill>
+          <a:blip r:embed="rId2">
+            <a:extLst>
+              <a:ext uri="{28A0092B-C50C-407E-A947-70E740481C1C}">
+                <a14:useLocalDpi xmlns:a14="http://schemas.microsoft.com/office/drawing/2010/main" val="0"/>
+              </a:ext>
+            </a:extLst>
+          </a:blip>
+          <a:srcRect/>
+          <a:stretch>
+            <a:fillRect/>
+          </a:stretch>
+        </p:blipFill>
+        <p:spPr bwMode="auto">
+          <a:xfrm>
+            <a:off x="1509583" y="2455604"/>
+            <a:ext cx="9169657" cy="3590117"/>
+          </a:xfrm>
+          <a:prstGeom prst="rect">
+            <a:avLst/>
+          </a:prstGeom>
+          <a:noFill/>
+          <a:extLst>
+            <a:ext uri="{909E8E84-426E-40DD-AFC4-6F175D3DCCD1}">
+              <a14:hiddenFill xmlns:a14="http://schemas.microsoft.com/office/drawing/2010/main">
+                <a:solidFill>
+                  <a:srgbClr val="FFFFFF"/>
+                </a:solidFill>
+              </a14:hiddenFill>
+            </a:ext>
+          </a:extLst>
+        </p:spPr>
+      </p:pic>
+    </p:spTree>
+    <p:extLst>
+      <p:ext uri="{BB962C8B-B14F-4D97-AF65-F5344CB8AC3E}">
+        <p14:creationId xmlns:p14="http://schemas.microsoft.com/office/powerpoint/2010/main" val="470597272"/>
+      </p:ext>
+    </p:extLst>
+  </p:cSld>
+  <p:clrMapOvr>
+    <a:masterClrMapping/>
+  </p:clrMapOvr>
+</p:sld>
+</file>
+
+<file path=ppt/slides/slide7.xml><?xml version="1.0" encoding="utf-8"?>
+<p:sld xmlns:a="http://schemas.openxmlformats.org/drawingml/2006/main" xmlns:r="http://schemas.openxmlformats.org/officeDocument/2006/relationships" xmlns:p="http://schemas.openxmlformats.org/presentationml/2006/main">
+  <p:cSld>
+    <p:spTree>
+      <p:nvGrpSpPr>
+        <p:cNvPr id="1" name=""/>
+        <p:cNvGrpSpPr/>
+        <p:nvPr/>
+      </p:nvGrpSpPr>
+      <p:grpSpPr>
+        <a:xfrm>
+          <a:off x="0" y="0"/>
+          <a:ext cx="0" cy="0"/>
+          <a:chOff x="0" y="0"/>
+          <a:chExt cx="0" cy="0"/>
+        </a:xfrm>
+      </p:grpSpPr>
+      <p:sp>
+        <p:nvSpPr>
+          <p:cNvPr id="2" name="Title 1"/>
+          <p:cNvSpPr>
+            <a:spLocks noGrp="1"/>
+          </p:cNvSpPr>
+          <p:nvPr>
+            <p:ph type="title"/>
+          </p:nvPr>
+        </p:nvSpPr>
+        <p:spPr/>
+        <p:txBody>
+          <a:bodyPr/>
+          <a:lstStyle/>
+          <a:p>
+            <a:pPr algn="ctr"/>
+            <a:r>
+              <a:rPr lang="bg-BG" dirty="0" smtClean="0"/>
+              <a:t>Тип </a:t>
+            </a:r>
+            <a:r>
+              <a:rPr lang="en-US" dirty="0" smtClean="0"/>
+              <a:t>object </a:t>
+            </a:r>
+            <a:r>
+              <a:rPr lang="bg-BG" dirty="0" smtClean="0"/>
+              <a:t>в</a:t>
+            </a:r>
+            <a:r>
+              <a:rPr lang="en-US" dirty="0" smtClean="0"/>
+              <a:t> JAVA</a:t>
             </a:r>
             <a:endParaRPr lang="en-US" dirty="0"/>
           </a:p>
@@ -12646,6 +15307,54 @@
           <a:bodyPr/>
           <a:lstStyle/>
           <a:p>
+            <a:r>
+              <a:rPr lang="bg-BG" dirty="0" smtClean="0"/>
+              <a:t>Всички класове в </a:t>
+            </a:r>
+            <a:r>
+              <a:rPr lang="en-US" dirty="0" smtClean="0"/>
+              <a:t>Java </a:t>
+            </a:r>
+            <a:r>
+              <a:rPr lang="bg-BG" dirty="0" smtClean="0"/>
+              <a:t>наследяват типът (класът</a:t>
+            </a:r>
+            <a:r>
+              <a:rPr lang="en-US" dirty="0" smtClean="0"/>
+              <a:t>)</a:t>
+            </a:r>
+            <a:r>
+              <a:rPr lang="bg-BG" dirty="0" smtClean="0"/>
+              <a:t> </a:t>
+            </a:r>
+            <a:r>
+              <a:rPr lang="en-US" dirty="0" smtClean="0"/>
+              <a:t>object</a:t>
+            </a:r>
+          </a:p>
+          <a:p>
+            <a:r>
+              <a:rPr lang="bg-BG" dirty="0" smtClean="0"/>
+              <a:t>Типът </a:t>
+            </a:r>
+            <a:r>
+              <a:rPr lang="en-US" dirty="0" smtClean="0"/>
+              <a:t>object </a:t>
+            </a:r>
+            <a:r>
+              <a:rPr lang="bg-BG" dirty="0" smtClean="0"/>
+              <a:t>може да съхранява променливи от всякакъв тип</a:t>
+            </a:r>
+          </a:p>
+          <a:p>
+            <a:r>
+              <a:rPr lang="bg-BG" dirty="0" smtClean="0"/>
+              <a:t>В практиката програмистите избягват да използват типът </a:t>
+            </a:r>
+            <a:r>
+              <a:rPr lang="en-US" dirty="0" smtClean="0"/>
+              <a:t>object</a:t>
+            </a:r>
             <a:endParaRPr lang="en-US" dirty="0"/>
           </a:p>
         </p:txBody>
@@ -12653,7 +15362,238 @@
     </p:spTree>
     <p:extLst>
       <p:ext uri="{BB962C8B-B14F-4D97-AF65-F5344CB8AC3E}">
-        <p14:creationId xmlns:p14="http://schemas.microsoft.com/office/powerpoint/2010/main" val="1149376270"/>
+        <p14:creationId xmlns:p14="http://schemas.microsoft.com/office/powerpoint/2010/main" val="3072847120"/>
+      </p:ext>
+    </p:extLst>
+  </p:cSld>
+  <p:clrMapOvr>
+    <a:masterClrMapping/>
+  </p:clrMapOvr>
+</p:sld>
+</file>
+
+<file path=ppt/slides/slide8.xml><?xml version="1.0" encoding="utf-8"?>
+<p:sld xmlns:a="http://schemas.openxmlformats.org/drawingml/2006/main" xmlns:r="http://schemas.openxmlformats.org/officeDocument/2006/relationships" xmlns:p="http://schemas.openxmlformats.org/presentationml/2006/main">
+  <p:cSld>
+    <p:spTree>
+      <p:nvGrpSpPr>
+        <p:cNvPr id="1" name=""/>
+        <p:cNvGrpSpPr/>
+        <p:nvPr/>
+      </p:nvGrpSpPr>
+      <p:grpSpPr>
+        <a:xfrm>
+          <a:off x="0" y="0"/>
+          <a:ext cx="0" cy="0"/>
+          <a:chOff x="0" y="0"/>
+          <a:chExt cx="0" cy="0"/>
+        </a:xfrm>
+      </p:grpSpPr>
+      <p:sp>
+        <p:nvSpPr>
+          <p:cNvPr id="2" name="Title 1"/>
+          <p:cNvSpPr>
+            <a:spLocks noGrp="1"/>
+          </p:cNvSpPr>
+          <p:nvPr>
+            <p:ph type="title"/>
+          </p:nvPr>
+        </p:nvSpPr>
+        <p:spPr/>
+        <p:txBody>
+          <a:bodyPr/>
+          <a:lstStyle/>
+          <a:p>
+            <a:pPr algn="ctr"/>
+            <a:r>
+              <a:rPr lang="bg-BG" dirty="0"/>
+              <a:t>Тип </a:t>
+            </a:r>
+            <a:r>
+              <a:rPr lang="en-US" dirty="0"/>
+              <a:t>object </a:t>
+            </a:r>
+            <a:r>
+              <a:rPr lang="bg-BG" dirty="0"/>
+              <a:t>в</a:t>
+            </a:r>
+            <a:r>
+              <a:rPr lang="en-US" dirty="0"/>
+              <a:t> </a:t>
+            </a:r>
+            <a:r>
+              <a:rPr lang="en-US" dirty="0" smtClean="0"/>
+              <a:t>JAVA </a:t>
+            </a:r>
+            <a:r>
+              <a:rPr lang="bg-BG" dirty="0" smtClean="0"/>
+              <a:t>демо</a:t>
+            </a:r>
+            <a:endParaRPr lang="en-US" dirty="0"/>
+          </a:p>
+        </p:txBody>
+      </p:sp>
+      <p:pic>
+        <p:nvPicPr>
+          <p:cNvPr id="4" name="Picture 2" descr="http://img.c4learn.com/2012/02/Variable-in-Java.jpg"/>
+          <p:cNvPicPr>
+            <a:picLocks noChangeAspect="1" noChangeArrowheads="1"/>
+          </p:cNvPicPr>
+          <p:nvPr/>
+        </p:nvPicPr>
+        <p:blipFill>
+          <a:blip r:embed="rId2">
+            <a:extLst>
+              <a:ext uri="{28A0092B-C50C-407E-A947-70E740481C1C}">
+                <a14:useLocalDpi xmlns:a14="http://schemas.microsoft.com/office/drawing/2010/main" val="0"/>
+              </a:ext>
+            </a:extLst>
+          </a:blip>
+          <a:srcRect/>
+          <a:stretch>
+            <a:fillRect/>
+          </a:stretch>
+        </p:blipFill>
+        <p:spPr bwMode="auto">
+          <a:xfrm>
+            <a:off x="2007972" y="2030325"/>
+            <a:ext cx="8172880" cy="4678825"/>
+          </a:xfrm>
+          <a:prstGeom prst="rect">
+            <a:avLst/>
+          </a:prstGeom>
+          <a:noFill/>
+          <a:extLst>
+            <a:ext uri="{909E8E84-426E-40DD-AFC4-6F175D3DCCD1}">
+              <a14:hiddenFill xmlns:a14="http://schemas.microsoft.com/office/drawing/2010/main">
+                <a:solidFill>
+                  <a:srgbClr val="FFFFFF"/>
+                </a:solidFill>
+              </a14:hiddenFill>
+            </a:ext>
+          </a:extLst>
+        </p:spPr>
+      </p:pic>
+    </p:spTree>
+    <p:extLst>
+      <p:ext uri="{BB962C8B-B14F-4D97-AF65-F5344CB8AC3E}">
+        <p14:creationId xmlns:p14="http://schemas.microsoft.com/office/powerpoint/2010/main" val="3420944244"/>
+      </p:ext>
+    </p:extLst>
+  </p:cSld>
+  <p:clrMapOvr>
+    <a:masterClrMapping/>
+  </p:clrMapOvr>
+</p:sld>
+</file>
+
+<file path=ppt/slides/slide9.xml><?xml version="1.0" encoding="utf-8"?>
+<p:sld xmlns:a="http://schemas.openxmlformats.org/drawingml/2006/main" xmlns:r="http://schemas.openxmlformats.org/officeDocument/2006/relationships" xmlns:p="http://schemas.openxmlformats.org/presentationml/2006/main">
+  <p:cSld>
+    <p:spTree>
+      <p:nvGrpSpPr>
+        <p:cNvPr id="1" name=""/>
+        <p:cNvGrpSpPr/>
+        <p:nvPr/>
+      </p:nvGrpSpPr>
+      <p:grpSpPr>
+        <a:xfrm>
+          <a:off x="0" y="0"/>
+          <a:ext cx="0" cy="0"/>
+          <a:chOff x="0" y="0"/>
+          <a:chExt cx="0" cy="0"/>
+        </a:xfrm>
+      </p:grpSpPr>
+      <p:sp>
+        <p:nvSpPr>
+          <p:cNvPr id="2" name="Title 1"/>
+          <p:cNvSpPr>
+            <a:spLocks noGrp="1"/>
+          </p:cNvSpPr>
+          <p:nvPr>
+            <p:ph type="title"/>
+          </p:nvPr>
+        </p:nvSpPr>
+        <p:spPr/>
+        <p:txBody>
+          <a:bodyPr/>
+          <a:lstStyle/>
+          <a:p>
+            <a:pPr algn="ctr"/>
+            <a:r>
+              <a:rPr lang="bg-BG" dirty="0" smtClean="0"/>
+              <a:t>Референтно представяне на</a:t>
+            </a:r>
+            <a:r>
+              <a:rPr lang="en-US" dirty="0" smtClean="0"/>
+              <a:t/>
+            </a:r>
+            <a:br>
+              <a:rPr lang="en-US" dirty="0" smtClean="0"/>
+            </a:br>
+            <a:r>
+              <a:rPr lang="bg-BG" dirty="0" smtClean="0"/>
+              <a:t> примитивните типове</a:t>
+            </a:r>
+            <a:endParaRPr lang="en-US" dirty="0"/>
+          </a:p>
+        </p:txBody>
+      </p:sp>
+      <p:sp>
+        <p:nvSpPr>
+          <p:cNvPr id="3" name="Content Placeholder 2"/>
+          <p:cNvSpPr>
+            <a:spLocks noGrp="1"/>
+          </p:cNvSpPr>
+          <p:nvPr>
+            <p:ph idx="1"/>
+          </p:nvPr>
+        </p:nvSpPr>
+        <p:spPr/>
+        <p:txBody>
+          <a:bodyPr/>
+          <a:lstStyle/>
+          <a:p>
+            <a:r>
+              <a:rPr lang="bg-BG" dirty="0" smtClean="0"/>
+              <a:t>Всички стойностни примитивни типове имат своето представяне като референтен тип</a:t>
+            </a:r>
+          </a:p>
+          <a:p>
+            <a:r>
+              <a:rPr lang="bg-BG" dirty="0" smtClean="0"/>
+              <a:t>За разлика от примитивните типове, тези могат да бъдат </a:t>
+            </a:r>
+            <a:r>
+              <a:rPr lang="en-US" dirty="0" smtClean="0"/>
+              <a:t>null</a:t>
+            </a:r>
+          </a:p>
+          <a:p>
+            <a:r>
+              <a:rPr lang="en-US" dirty="0" err="1" smtClean="0"/>
+              <a:t>Int</a:t>
+            </a:r>
+            <a:r>
+              <a:rPr lang="en-US" dirty="0" smtClean="0"/>
+              <a:t> – Integer, double – Double, Boolean </a:t>
+            </a:r>
+            <a:r>
+              <a:rPr lang="en-US" dirty="0" err="1" smtClean="0"/>
+              <a:t>Boolean</a:t>
+            </a:r>
+            <a:r>
+              <a:rPr lang="bg-BG" dirty="0" smtClean="0"/>
+              <a:t> </a:t>
+            </a:r>
+            <a:endParaRPr lang="en-US" dirty="0"/>
+          </a:p>
+        </p:txBody>
+      </p:sp>
+    </p:spTree>
+    <p:extLst>
+      <p:ext uri="{BB962C8B-B14F-4D97-AF65-F5344CB8AC3E}">
+        <p14:creationId xmlns:p14="http://schemas.microsoft.com/office/powerpoint/2010/main" val="1937081969"/>
       </p:ext>
     </p:extLst>
   </p:cSld>

</xml_diff>